<commit_message>
myo band illustration corrections
</commit_message>
<xml_diff>
--- a/website/Interface/interface.pptx
+++ b/website/Interface/interface.pptx
@@ -16172,8 +16172,8 @@
             </p:nvSpPr>
             <p:spPr>
               <a:xfrm>
-                <a:off x="3500272" y="6289912"/>
-                <a:ext cx="140265" cy="66061"/>
+                <a:off x="3519435" y="6293541"/>
+                <a:ext cx="98568" cy="62512"/>
               </a:xfrm>
               <a:prstGeom prst="roundRect">
                 <a:avLst>
@@ -16373,8 +16373,8 @@
             </p:nvSpPr>
             <p:spPr>
               <a:xfrm>
-                <a:off x="2684503" y="6268059"/>
-                <a:ext cx="820804" cy="235614"/>
+                <a:off x="2684502" y="6275239"/>
+                <a:ext cx="834537" cy="228433"/>
               </a:xfrm>
               <a:prstGeom prst="roundRect">
                 <a:avLst>
@@ -16440,8 +16440,8 @@
             </p:nvSpPr>
             <p:spPr>
               <a:xfrm>
-                <a:off x="2605187" y="6221274"/>
-                <a:ext cx="85546" cy="513496"/>
+                <a:off x="2601558" y="6221274"/>
+                <a:ext cx="81972" cy="513496"/>
               </a:xfrm>
               <a:prstGeom prst="roundRect">
                 <a:avLst>
@@ -18216,8 +18216,8 @@
             </p:nvSpPr>
             <p:spPr>
               <a:xfrm>
-                <a:off x="2637947" y="6226509"/>
-                <a:ext cx="97620" cy="513496"/>
+                <a:off x="2596817" y="6226509"/>
+                <a:ext cx="86033" cy="513496"/>
               </a:xfrm>
               <a:prstGeom prst="roundRect">
                 <a:avLst>
@@ -18560,7 +18560,7 @@
         </p:nvGrpSpPr>
         <p:grpSpPr>
           <a:xfrm>
-            <a:off x="105864" y="128924"/>
+            <a:off x="202875" y="2938383"/>
             <a:ext cx="2856668" cy="2574839"/>
             <a:chOff x="2361802" y="5540985"/>
             <a:chExt cx="2856668" cy="2574839"/>
@@ -19539,52 +19539,6 @@
         </p:grpSp>
         <p:sp>
           <p:nvSpPr>
-            <p:cNvPr id="47" name="Rectangle 46">
-              <a:extLst>
-                <a:ext uri="{FF2B5EF4-FFF2-40B4-BE49-F238E27FC236}">
-                  <a16:creationId xmlns:a16="http://schemas.microsoft.com/office/drawing/2014/main" id="{E7FFB3BB-0A5E-5243-AD70-D338F7B48CCE}"/>
-                </a:ext>
-              </a:extLst>
-            </p:cNvPr>
-            <p:cNvSpPr/>
-            <p:nvPr/>
-          </p:nvSpPr>
-          <p:spPr>
-            <a:xfrm>
-              <a:off x="2374404" y="6242291"/>
-              <a:ext cx="295900" cy="432262"/>
-            </a:xfrm>
-            <a:prstGeom prst="rect">
-              <a:avLst/>
-            </a:prstGeom>
-          </p:spPr>
-          <p:style>
-            <a:lnRef idx="2">
-              <a:schemeClr val="accent1">
-                <a:shade val="50000"/>
-              </a:schemeClr>
-            </a:lnRef>
-            <a:fillRef idx="1">
-              <a:schemeClr val="accent1"/>
-            </a:fillRef>
-            <a:effectRef idx="0">
-              <a:schemeClr val="accent1"/>
-            </a:effectRef>
-            <a:fontRef idx="minor">
-              <a:schemeClr val="lt1"/>
-            </a:fontRef>
-          </p:style>
-          <p:txBody>
-            <a:bodyPr rtlCol="0" anchor="ctr"/>
-            <a:lstStyle/>
-            <a:p>
-              <a:pPr algn="ctr"/>
-              <a:endParaRPr lang="en-GB"/>
-            </a:p>
-          </p:txBody>
-        </p:sp>
-        <p:sp>
-          <p:nvSpPr>
             <p:cNvPr id="57" name="Rectangle 56">
               <a:extLst>
                 <a:ext uri="{FF2B5EF4-FFF2-40B4-BE49-F238E27FC236}">
@@ -20242,3369 +20196,12 @@
             </a:p>
           </p:txBody>
         </p:sp>
-      </p:grpSp>
-      <p:grpSp>
-        <p:nvGrpSpPr>
-          <p:cNvPr id="199" name="Group 198">
-            <a:extLst>
-              <a:ext uri="{FF2B5EF4-FFF2-40B4-BE49-F238E27FC236}">
-                <a16:creationId xmlns:a16="http://schemas.microsoft.com/office/drawing/2014/main" id="{68BD9D76-79C2-9345-8B66-134DD0CB10DA}"/>
-              </a:ext>
-            </a:extLst>
-          </p:cNvPr>
-          <p:cNvGrpSpPr/>
-          <p:nvPr/>
-        </p:nvGrpSpPr>
-        <p:grpSpPr>
-          <a:xfrm>
-            <a:off x="3473075" y="64411"/>
-            <a:ext cx="2856668" cy="2574839"/>
-            <a:chOff x="2361802" y="5540985"/>
-            <a:chExt cx="2856668" cy="2574839"/>
-          </a:xfrm>
-        </p:grpSpPr>
         <p:sp>
           <p:nvSpPr>
-            <p:cNvPr id="200" name="TextBox 199">
+            <p:cNvPr id="47" name="Rectangle 46">
               <a:extLst>
                 <a:ext uri="{FF2B5EF4-FFF2-40B4-BE49-F238E27FC236}">
-                  <a16:creationId xmlns:a16="http://schemas.microsoft.com/office/drawing/2014/main" id="{B50FA961-478F-1A4F-93A8-FBFE32B0247C}"/>
-                </a:ext>
-              </a:extLst>
-            </p:cNvPr>
-            <p:cNvSpPr txBox="1"/>
-            <p:nvPr/>
-          </p:nvSpPr>
-          <p:spPr>
-            <a:xfrm>
-              <a:off x="2758241" y="6289913"/>
-              <a:ext cx="335989" cy="369332"/>
-            </a:xfrm>
-            <a:prstGeom prst="rect">
-              <a:avLst/>
-            </a:prstGeom>
-            <a:solidFill>
-              <a:schemeClr val="accent1">
-                <a:alpha val="96000"/>
-              </a:schemeClr>
-            </a:solidFill>
-          </p:spPr>
-          <p:txBody>
-            <a:bodyPr wrap="square" rtlCol="0">
-              <a:spAutoFit/>
-            </a:bodyPr>
-            <a:lstStyle/>
-            <a:p>
-              <a:endParaRPr lang="en-GB" dirty="0"/>
-            </a:p>
-          </p:txBody>
-        </p:sp>
-        <p:sp>
-          <p:nvSpPr>
-            <p:cNvPr id="201" name="Rectangle 200">
-              <a:extLst>
-                <a:ext uri="{FF2B5EF4-FFF2-40B4-BE49-F238E27FC236}">
-                  <a16:creationId xmlns:a16="http://schemas.microsoft.com/office/drawing/2014/main" id="{8C2F376B-D946-884B-89F8-3B3FBDF51F31}"/>
-                </a:ext>
-              </a:extLst>
-            </p:cNvPr>
-            <p:cNvSpPr/>
-            <p:nvPr/>
-          </p:nvSpPr>
-          <p:spPr>
-            <a:xfrm>
-              <a:off x="3228312" y="6298397"/>
-              <a:ext cx="295900" cy="432262"/>
-            </a:xfrm>
-            <a:prstGeom prst="rect">
-              <a:avLst/>
-            </a:prstGeom>
-          </p:spPr>
-          <p:style>
-            <a:lnRef idx="2">
-              <a:schemeClr val="accent1">
-                <a:shade val="50000"/>
-              </a:schemeClr>
-            </a:lnRef>
-            <a:fillRef idx="1">
-              <a:schemeClr val="accent1"/>
-            </a:fillRef>
-            <a:effectRef idx="0">
-              <a:schemeClr val="accent1"/>
-            </a:effectRef>
-            <a:fontRef idx="minor">
-              <a:schemeClr val="lt1"/>
-            </a:fontRef>
-          </p:style>
-          <p:txBody>
-            <a:bodyPr rtlCol="0" anchor="ctr"/>
-            <a:lstStyle/>
-            <a:p>
-              <a:pPr algn="ctr"/>
-              <a:endParaRPr lang="en-GB"/>
-            </a:p>
-          </p:txBody>
-        </p:sp>
-        <p:sp>
-          <p:nvSpPr>
-            <p:cNvPr id="202" name="Rectangle 201">
-              <a:extLst>
-                <a:ext uri="{FF2B5EF4-FFF2-40B4-BE49-F238E27FC236}">
-                  <a16:creationId xmlns:a16="http://schemas.microsoft.com/office/drawing/2014/main" id="{8831E6BB-2E49-1B41-8524-27EFEC3A40AE}"/>
-                </a:ext>
-              </a:extLst>
-            </p:cNvPr>
-            <p:cNvSpPr/>
-            <p:nvPr/>
-          </p:nvSpPr>
-          <p:spPr>
-            <a:xfrm>
-              <a:off x="3560444" y="6210882"/>
-              <a:ext cx="295900" cy="432262"/>
-            </a:xfrm>
-            <a:prstGeom prst="rect">
-              <a:avLst/>
-            </a:prstGeom>
-          </p:spPr>
-          <p:style>
-            <a:lnRef idx="2">
-              <a:schemeClr val="accent1">
-                <a:shade val="50000"/>
-              </a:schemeClr>
-            </a:lnRef>
-            <a:fillRef idx="1">
-              <a:schemeClr val="accent1"/>
-            </a:fillRef>
-            <a:effectRef idx="0">
-              <a:schemeClr val="accent1"/>
-            </a:effectRef>
-            <a:fontRef idx="minor">
-              <a:schemeClr val="lt1"/>
-            </a:fontRef>
-          </p:style>
-          <p:txBody>
-            <a:bodyPr rtlCol="0" anchor="ctr"/>
-            <a:lstStyle/>
-            <a:p>
-              <a:pPr algn="ctr"/>
-              <a:endParaRPr lang="en-GB"/>
-            </a:p>
-          </p:txBody>
-        </p:sp>
-        <p:grpSp>
-          <p:nvGrpSpPr>
-            <p:cNvPr id="203" name="Group 202">
-              <a:extLst>
-                <a:ext uri="{FF2B5EF4-FFF2-40B4-BE49-F238E27FC236}">
-                  <a16:creationId xmlns:a16="http://schemas.microsoft.com/office/drawing/2014/main" id="{FA3AC17D-40E3-A142-B56F-34079D682619}"/>
-                </a:ext>
-              </a:extLst>
-            </p:cNvPr>
-            <p:cNvGrpSpPr>
-              <a:grpSpLocks noChangeAspect="1"/>
-            </p:cNvGrpSpPr>
-            <p:nvPr/>
-          </p:nvGrpSpPr>
-          <p:grpSpPr>
-            <a:xfrm rot="483744">
-              <a:off x="2781928" y="6273482"/>
-              <a:ext cx="2436542" cy="1629757"/>
-              <a:chOff x="4549167" y="6054246"/>
-              <a:chExt cx="1220265" cy="911014"/>
-            </a:xfrm>
-          </p:grpSpPr>
-          <p:grpSp>
-            <p:nvGrpSpPr>
-              <p:cNvPr id="224" name="Group 223">
-                <a:extLst>
-                  <a:ext uri="{FF2B5EF4-FFF2-40B4-BE49-F238E27FC236}">
-                    <a16:creationId xmlns:a16="http://schemas.microsoft.com/office/drawing/2014/main" id="{E33305E2-DF6F-3D46-A501-7E6058FBB2E3}"/>
-                  </a:ext>
-                </a:extLst>
-              </p:cNvPr>
-              <p:cNvGrpSpPr/>
-              <p:nvPr/>
-            </p:nvGrpSpPr>
-            <p:grpSpPr>
-              <a:xfrm>
-                <a:off x="4549167" y="6054246"/>
-                <a:ext cx="1169843" cy="911014"/>
-                <a:chOff x="4040986" y="6146585"/>
-                <a:chExt cx="1169843" cy="911014"/>
-              </a:xfrm>
-              <a:solidFill>
-                <a:srgbClr val="D7AE85"/>
-              </a:solidFill>
-            </p:grpSpPr>
-            <p:grpSp>
-              <p:nvGrpSpPr>
-                <p:cNvPr id="229" name="Group 228">
-                  <a:extLst>
-                    <a:ext uri="{FF2B5EF4-FFF2-40B4-BE49-F238E27FC236}">
-                      <a16:creationId xmlns:a16="http://schemas.microsoft.com/office/drawing/2014/main" id="{1D966FD2-08F5-C54A-89B0-A2644699005F}"/>
-                    </a:ext>
-                  </a:extLst>
-                </p:cNvPr>
-                <p:cNvGrpSpPr/>
-                <p:nvPr/>
-              </p:nvGrpSpPr>
-              <p:grpSpPr>
-                <a:xfrm>
-                  <a:off x="4040986" y="6229693"/>
-                  <a:ext cx="1169843" cy="827906"/>
-                  <a:chOff x="-1449857" y="5793212"/>
-                  <a:chExt cx="2121522" cy="1659459"/>
-                </a:xfrm>
-                <a:grpFill/>
-              </p:grpSpPr>
-              <p:sp>
-                <p:nvSpPr>
-                  <p:cNvPr id="231" name="Rounded Rectangle 230">
-                    <a:extLst>
-                      <a:ext uri="{FF2B5EF4-FFF2-40B4-BE49-F238E27FC236}">
-                        <a16:creationId xmlns:a16="http://schemas.microsoft.com/office/drawing/2014/main" id="{E0D19AF4-8108-5741-97D1-C01761330393}"/>
-                      </a:ext>
-                    </a:extLst>
-                  </p:cNvPr>
-                  <p:cNvSpPr/>
-                  <p:nvPr/>
-                </p:nvSpPr>
-                <p:spPr>
-                  <a:xfrm rot="14184732">
-                    <a:off x="-1112420" y="6263929"/>
-                    <a:ext cx="851305" cy="1526179"/>
-                  </a:xfrm>
-                  <a:prstGeom prst="roundRect">
-                    <a:avLst>
-                      <a:gd name="adj" fmla="val 26385"/>
-                    </a:avLst>
-                  </a:prstGeom>
-                  <a:grpFill/>
-                  <a:ln>
-                    <a:noFill/>
-                  </a:ln>
-                </p:spPr>
-                <p:style>
-                  <a:lnRef idx="2">
-                    <a:schemeClr val="accent1">
-                      <a:shade val="50000"/>
-                    </a:schemeClr>
-                  </a:lnRef>
-                  <a:fillRef idx="1">
-                    <a:schemeClr val="accent1"/>
-                  </a:fillRef>
-                  <a:effectRef idx="0">
-                    <a:schemeClr val="accent1"/>
-                  </a:effectRef>
-                  <a:fontRef idx="minor">
-                    <a:schemeClr val="lt1"/>
-                  </a:fontRef>
-                </p:style>
-                <p:txBody>
-                  <a:bodyPr rot="0" spcFirstLastPara="0" vertOverflow="overflow" horzOverflow="overflow" vert="horz" wrap="square" lIns="91440" tIns="45720" rIns="91440" bIns="45720" numCol="1" spcCol="0" rtlCol="0" fromWordArt="0" anchor="ctr" anchorCtr="0" forceAA="0" compatLnSpc="1">
-                    <a:prstTxWarp prst="textNoShape">
-                      <a:avLst/>
-                    </a:prstTxWarp>
-                    <a:noAutofit/>
-                  </a:bodyPr>
-                  <a:lstStyle/>
-                  <a:p>
-                    <a:pPr algn="ctr"/>
-                    <a:endParaRPr lang="en-GB"/>
-                  </a:p>
-                </p:txBody>
-              </p:sp>
-              <p:sp>
-                <p:nvSpPr>
-                  <p:cNvPr id="232" name="Rounded Rectangle 231">
-                    <a:extLst>
-                      <a:ext uri="{FF2B5EF4-FFF2-40B4-BE49-F238E27FC236}">
-                        <a16:creationId xmlns:a16="http://schemas.microsoft.com/office/drawing/2014/main" id="{DA344497-5B89-294A-A23A-6BCFF8CD100F}"/>
-                      </a:ext>
-                    </a:extLst>
-                  </p:cNvPr>
-                  <p:cNvSpPr/>
-                  <p:nvPr/>
-                </p:nvSpPr>
-                <p:spPr>
-                  <a:xfrm rot="13845605">
-                    <a:off x="-288116" y="5831893"/>
-                    <a:ext cx="998461" cy="921100"/>
-                  </a:xfrm>
-                  <a:prstGeom prst="roundRect">
-                    <a:avLst>
-                      <a:gd name="adj" fmla="val 41216"/>
-                    </a:avLst>
-                  </a:prstGeom>
-                  <a:grpFill/>
-                  <a:ln>
-                    <a:noFill/>
-                  </a:ln>
-                </p:spPr>
-                <p:style>
-                  <a:lnRef idx="2">
-                    <a:schemeClr val="accent1">
-                      <a:shade val="50000"/>
-                    </a:schemeClr>
-                  </a:lnRef>
-                  <a:fillRef idx="1">
-                    <a:schemeClr val="accent1"/>
-                  </a:fillRef>
-                  <a:effectRef idx="0">
-                    <a:schemeClr val="accent1"/>
-                  </a:effectRef>
-                  <a:fontRef idx="minor">
-                    <a:schemeClr val="lt1"/>
-                  </a:fontRef>
-                </p:style>
-                <p:txBody>
-                  <a:bodyPr rot="0" spcFirstLastPara="0" vertOverflow="overflow" horzOverflow="overflow" vert="horz" wrap="square" lIns="91440" tIns="45720" rIns="91440" bIns="45720" numCol="1" spcCol="0" rtlCol="0" fromWordArt="0" anchor="ctr" anchorCtr="0" forceAA="0" compatLnSpc="1">
-                    <a:prstTxWarp prst="textNoShape">
-                      <a:avLst/>
-                    </a:prstTxWarp>
-                    <a:noAutofit/>
-                  </a:bodyPr>
-                  <a:lstStyle/>
-                  <a:p>
-                    <a:pPr algn="ctr"/>
-                    <a:endParaRPr lang="en-GB"/>
-                  </a:p>
-                </p:txBody>
-              </p:sp>
-            </p:grpSp>
-            <p:sp>
-              <p:nvSpPr>
-                <p:cNvPr id="230" name="Rounded Rectangle 229">
-                  <a:extLst>
-                    <a:ext uri="{FF2B5EF4-FFF2-40B4-BE49-F238E27FC236}">
-                      <a16:creationId xmlns:a16="http://schemas.microsoft.com/office/drawing/2014/main" id="{781D43AA-44BC-A440-9456-25E977B47CEA}"/>
-                    </a:ext>
-                  </a:extLst>
-                </p:cNvPr>
-                <p:cNvSpPr/>
-                <p:nvPr/>
-              </p:nvSpPr>
-              <p:spPr>
-                <a:xfrm rot="10173171">
-                  <a:off x="4624993" y="6146585"/>
-                  <a:ext cx="219626" cy="572774"/>
-                </a:xfrm>
-                <a:prstGeom prst="roundRect">
-                  <a:avLst>
-                    <a:gd name="adj" fmla="val 41216"/>
-                  </a:avLst>
-                </a:prstGeom>
-                <a:grpFill/>
-                <a:ln>
-                  <a:noFill/>
-                </a:ln>
-              </p:spPr>
-              <p:style>
-                <a:lnRef idx="2">
-                  <a:schemeClr val="accent1">
-                    <a:shade val="50000"/>
-                  </a:schemeClr>
-                </a:lnRef>
-                <a:fillRef idx="1">
-                  <a:schemeClr val="accent1"/>
-                </a:fillRef>
-                <a:effectRef idx="0">
-                  <a:schemeClr val="accent1"/>
-                </a:effectRef>
-                <a:fontRef idx="minor">
-                  <a:schemeClr val="lt1"/>
-                </a:fontRef>
-              </p:style>
-              <p:txBody>
-                <a:bodyPr rot="0" spcFirstLastPara="0" vertOverflow="overflow" horzOverflow="overflow" vert="horz" wrap="square" lIns="91440" tIns="45720" rIns="91440" bIns="45720" numCol="1" spcCol="0" rtlCol="0" fromWordArt="0" anchor="ctr" anchorCtr="0" forceAA="0" compatLnSpc="1">
-                  <a:prstTxWarp prst="textNoShape">
-                    <a:avLst/>
-                  </a:prstTxWarp>
-                  <a:noAutofit/>
-                </a:bodyPr>
-                <a:lstStyle/>
-                <a:p>
-                  <a:pPr algn="ctr"/>
-                  <a:endParaRPr lang="en-GB"/>
-                </a:p>
-              </p:txBody>
-            </p:sp>
-          </p:grpSp>
-          <p:grpSp>
-            <p:nvGrpSpPr>
-              <p:cNvPr id="225" name="Group 224">
-                <a:extLst>
-                  <a:ext uri="{FF2B5EF4-FFF2-40B4-BE49-F238E27FC236}">
-                    <a16:creationId xmlns:a16="http://schemas.microsoft.com/office/drawing/2014/main" id="{03BAE036-E859-E641-AA53-8E178C4AA36B}"/>
-                  </a:ext>
-                </a:extLst>
-              </p:cNvPr>
-              <p:cNvGrpSpPr/>
-              <p:nvPr/>
-            </p:nvGrpSpPr>
-            <p:grpSpPr>
-              <a:xfrm>
-                <a:off x="4610365" y="6059983"/>
-                <a:ext cx="1159067" cy="869001"/>
-                <a:chOff x="4028105" y="6140963"/>
-                <a:chExt cx="1159067" cy="869001"/>
-              </a:xfrm>
-            </p:grpSpPr>
-            <p:sp>
-              <p:nvSpPr>
-                <p:cNvPr id="226" name="Rounded Rectangle 225">
-                  <a:extLst>
-                    <a:ext uri="{FF2B5EF4-FFF2-40B4-BE49-F238E27FC236}">
-                      <a16:creationId xmlns:a16="http://schemas.microsoft.com/office/drawing/2014/main" id="{EF80C720-6C8E-A74A-95D2-A6A536774452}"/>
-                    </a:ext>
-                  </a:extLst>
-                </p:cNvPr>
-                <p:cNvSpPr/>
-                <p:nvPr/>
-              </p:nvSpPr>
-              <p:spPr>
-                <a:xfrm rot="14184732">
-                  <a:off x="4262514" y="6402811"/>
-                  <a:ext cx="372744" cy="841561"/>
-                </a:xfrm>
-                <a:prstGeom prst="roundRect">
-                  <a:avLst/>
-                </a:prstGeom>
-                <a:solidFill>
-                  <a:srgbClr val="F8CC9A"/>
-                </a:solidFill>
-                <a:ln>
-                  <a:noFill/>
-                </a:ln>
-              </p:spPr>
-              <p:style>
-                <a:lnRef idx="2">
-                  <a:schemeClr val="accent1">
-                    <a:shade val="50000"/>
-                  </a:schemeClr>
-                </a:lnRef>
-                <a:fillRef idx="1">
-                  <a:schemeClr val="accent1"/>
-                </a:fillRef>
-                <a:effectRef idx="0">
-                  <a:schemeClr val="accent1"/>
-                </a:effectRef>
-                <a:fontRef idx="minor">
-                  <a:schemeClr val="lt1"/>
-                </a:fontRef>
-              </p:style>
-              <p:txBody>
-                <a:bodyPr rot="0" spcFirstLastPara="0" vertOverflow="overflow" horzOverflow="overflow" vert="horz" wrap="square" lIns="91440" tIns="45720" rIns="91440" bIns="45720" numCol="1" spcCol="0" rtlCol="0" fromWordArt="0" anchor="ctr" anchorCtr="0" forceAA="0" compatLnSpc="1">
-                  <a:prstTxWarp prst="textNoShape">
-                    <a:avLst/>
-                  </a:prstTxWarp>
-                  <a:noAutofit/>
-                </a:bodyPr>
-                <a:lstStyle/>
-                <a:p>
-                  <a:pPr algn="ctr"/>
-                  <a:endParaRPr lang="en-GB"/>
-                </a:p>
-              </p:txBody>
-            </p:sp>
-            <p:sp>
-              <p:nvSpPr>
-                <p:cNvPr id="227" name="Rounded Rectangle 226">
-                  <a:extLst>
-                    <a:ext uri="{FF2B5EF4-FFF2-40B4-BE49-F238E27FC236}">
-                      <a16:creationId xmlns:a16="http://schemas.microsoft.com/office/drawing/2014/main" id="{325192EE-6BE0-AC4C-B0D1-4657631F3658}"/>
-                    </a:ext>
-                  </a:extLst>
-                </p:cNvPr>
-                <p:cNvSpPr/>
-                <p:nvPr/>
-              </p:nvSpPr>
-              <p:spPr>
-                <a:xfrm rot="13845605">
-                  <a:off x="4697482" y="6246569"/>
-                  <a:ext cx="498133" cy="481246"/>
-                </a:xfrm>
-                <a:prstGeom prst="roundRect">
-                  <a:avLst>
-                    <a:gd name="adj" fmla="val 41216"/>
-                  </a:avLst>
-                </a:prstGeom>
-                <a:solidFill>
-                  <a:srgbClr val="F8CC9A"/>
-                </a:solidFill>
-                <a:ln>
-                  <a:noFill/>
-                </a:ln>
-              </p:spPr>
-              <p:style>
-                <a:lnRef idx="2">
-                  <a:schemeClr val="accent1">
-                    <a:shade val="50000"/>
-                  </a:schemeClr>
-                </a:lnRef>
-                <a:fillRef idx="1">
-                  <a:schemeClr val="accent1"/>
-                </a:fillRef>
-                <a:effectRef idx="0">
-                  <a:schemeClr val="accent1"/>
-                </a:effectRef>
-                <a:fontRef idx="minor">
-                  <a:schemeClr val="lt1"/>
-                </a:fontRef>
-              </p:style>
-              <p:txBody>
-                <a:bodyPr rot="0" spcFirstLastPara="0" vertOverflow="overflow" horzOverflow="overflow" vert="horz" wrap="square" lIns="91440" tIns="45720" rIns="91440" bIns="45720" numCol="1" spcCol="0" rtlCol="0" fromWordArt="0" anchor="ctr" anchorCtr="0" forceAA="0" compatLnSpc="1">
-                  <a:prstTxWarp prst="textNoShape">
-                    <a:avLst/>
-                  </a:prstTxWarp>
-                  <a:noAutofit/>
-                </a:bodyPr>
-                <a:lstStyle/>
-                <a:p>
-                  <a:pPr algn="ctr"/>
-                  <a:endParaRPr lang="en-GB"/>
-                </a:p>
-              </p:txBody>
-            </p:sp>
-            <p:sp>
-              <p:nvSpPr>
-                <p:cNvPr id="228" name="Rounded Rectangle 227">
-                  <a:extLst>
-                    <a:ext uri="{FF2B5EF4-FFF2-40B4-BE49-F238E27FC236}">
-                      <a16:creationId xmlns:a16="http://schemas.microsoft.com/office/drawing/2014/main" id="{1D2DF26A-2743-6243-B7B0-301C606A217E}"/>
-                    </a:ext>
-                  </a:extLst>
-                </p:cNvPr>
-                <p:cNvSpPr/>
-                <p:nvPr/>
-              </p:nvSpPr>
-              <p:spPr>
-                <a:xfrm rot="10173171">
-                  <a:off x="4620879" y="6140963"/>
-                  <a:ext cx="170254" cy="572773"/>
-                </a:xfrm>
-                <a:prstGeom prst="roundRect">
-                  <a:avLst>
-                    <a:gd name="adj" fmla="val 41216"/>
-                  </a:avLst>
-                </a:prstGeom>
-                <a:solidFill>
-                  <a:srgbClr val="F8CC9A"/>
-                </a:solidFill>
-                <a:ln>
-                  <a:noFill/>
-                </a:ln>
-              </p:spPr>
-              <p:style>
-                <a:lnRef idx="2">
-                  <a:schemeClr val="accent1">
-                    <a:shade val="50000"/>
-                  </a:schemeClr>
-                </a:lnRef>
-                <a:fillRef idx="1">
-                  <a:schemeClr val="accent1"/>
-                </a:fillRef>
-                <a:effectRef idx="0">
-                  <a:schemeClr val="accent1"/>
-                </a:effectRef>
-                <a:fontRef idx="minor">
-                  <a:schemeClr val="lt1"/>
-                </a:fontRef>
-              </p:style>
-              <p:txBody>
-                <a:bodyPr rot="0" spcFirstLastPara="0" vertOverflow="overflow" horzOverflow="overflow" vert="horz" wrap="square" lIns="91440" tIns="45720" rIns="91440" bIns="45720" numCol="1" spcCol="0" rtlCol="0" fromWordArt="0" anchor="ctr" anchorCtr="0" forceAA="0" compatLnSpc="1">
-                  <a:prstTxWarp prst="textNoShape">
-                    <a:avLst/>
-                  </a:prstTxWarp>
-                  <a:noAutofit/>
-                </a:bodyPr>
-                <a:lstStyle/>
-                <a:p>
-                  <a:pPr algn="ctr"/>
-                  <a:endParaRPr lang="en-GB"/>
-                </a:p>
-              </p:txBody>
-            </p:sp>
-          </p:grpSp>
-        </p:grpSp>
-        <p:grpSp>
-          <p:nvGrpSpPr>
-            <p:cNvPr id="204" name="Group 203">
-              <a:extLst>
-                <a:ext uri="{FF2B5EF4-FFF2-40B4-BE49-F238E27FC236}">
-                  <a16:creationId xmlns:a16="http://schemas.microsoft.com/office/drawing/2014/main" id="{31EABC3D-6D18-CF48-8B13-AD9E59FC79D1}"/>
-                </a:ext>
-              </a:extLst>
-            </p:cNvPr>
-            <p:cNvGrpSpPr>
-              <a:grpSpLocks noChangeAspect="1"/>
-            </p:cNvGrpSpPr>
-            <p:nvPr/>
-          </p:nvGrpSpPr>
-          <p:grpSpPr>
-            <a:xfrm>
-              <a:off x="2582202" y="5540985"/>
-              <a:ext cx="1067807" cy="2574839"/>
-              <a:chOff x="2120390" y="5713759"/>
-              <a:chExt cx="556258" cy="1497116"/>
-            </a:xfrm>
-          </p:grpSpPr>
-          <p:sp>
-            <p:nvSpPr>
-              <p:cNvPr id="218" name="Oval 217">
-                <a:extLst>
-                  <a:ext uri="{FF2B5EF4-FFF2-40B4-BE49-F238E27FC236}">
-                    <a16:creationId xmlns:a16="http://schemas.microsoft.com/office/drawing/2014/main" id="{613CE3EE-801F-9A49-AF6B-48117E290811}"/>
-                  </a:ext>
-                </a:extLst>
-              </p:cNvPr>
-              <p:cNvSpPr/>
-              <p:nvPr/>
-            </p:nvSpPr>
-            <p:spPr>
-              <a:xfrm>
-                <a:off x="2447721" y="5759324"/>
-                <a:ext cx="228927" cy="1303188"/>
-              </a:xfrm>
-              <a:prstGeom prst="ellipse">
-                <a:avLst/>
-              </a:prstGeom>
-              <a:solidFill>
-                <a:srgbClr val="D7AE85"/>
-              </a:solidFill>
-              <a:ln>
-                <a:noFill/>
-              </a:ln>
-            </p:spPr>
-            <p:style>
-              <a:lnRef idx="2">
-                <a:schemeClr val="accent1">
-                  <a:shade val="50000"/>
-                </a:schemeClr>
-              </a:lnRef>
-              <a:fillRef idx="1">
-                <a:schemeClr val="accent1"/>
-              </a:fillRef>
-              <a:effectRef idx="0">
-                <a:schemeClr val="accent1"/>
-              </a:effectRef>
-              <a:fontRef idx="minor">
-                <a:schemeClr val="lt1"/>
-              </a:fontRef>
-            </p:style>
-            <p:txBody>
-              <a:bodyPr rot="0" spcFirstLastPara="0" vertOverflow="overflow" horzOverflow="overflow" vert="horz" wrap="square" lIns="91440" tIns="45720" rIns="91440" bIns="45720" numCol="1" spcCol="0" rtlCol="0" fromWordArt="0" anchor="ctr" anchorCtr="0" forceAA="0" compatLnSpc="1">
-                <a:prstTxWarp prst="textNoShape">
-                  <a:avLst/>
-                </a:prstTxWarp>
-                <a:noAutofit/>
-              </a:bodyPr>
-              <a:lstStyle/>
-              <a:p>
-                <a:pPr algn="ctr"/>
-                <a:endParaRPr lang="en-GB">
-                  <a:solidFill>
-                    <a:schemeClr val="accent1">
-                      <a:alpha val="0"/>
-                    </a:schemeClr>
-                  </a:solidFill>
-                </a:endParaRPr>
-              </a:p>
-            </p:txBody>
-          </p:sp>
-          <p:sp>
-            <p:nvSpPr>
-              <p:cNvPr id="219" name="Rounded Rectangle 218">
-                <a:extLst>
-                  <a:ext uri="{FF2B5EF4-FFF2-40B4-BE49-F238E27FC236}">
-                    <a16:creationId xmlns:a16="http://schemas.microsoft.com/office/drawing/2014/main" id="{9023F9A5-408B-E441-8EAE-8D015AE921F6}"/>
-                  </a:ext>
-                </a:extLst>
-              </p:cNvPr>
-              <p:cNvSpPr/>
-              <p:nvPr/>
-            </p:nvSpPr>
-            <p:spPr>
-              <a:xfrm>
-                <a:off x="2162937" y="5713759"/>
-                <a:ext cx="450276" cy="1262483"/>
-              </a:xfrm>
-              <a:prstGeom prst="roundRect">
-                <a:avLst>
-                  <a:gd name="adj" fmla="val 26349"/>
-                </a:avLst>
-              </a:prstGeom>
-              <a:solidFill>
-                <a:srgbClr val="D7AE85"/>
-              </a:solidFill>
-              <a:ln>
-                <a:noFill/>
-              </a:ln>
-            </p:spPr>
-            <p:style>
-              <a:lnRef idx="2">
-                <a:schemeClr val="accent1">
-                  <a:shade val="50000"/>
-                </a:schemeClr>
-              </a:lnRef>
-              <a:fillRef idx="1">
-                <a:schemeClr val="accent1"/>
-              </a:fillRef>
-              <a:effectRef idx="0">
-                <a:schemeClr val="accent1"/>
-              </a:effectRef>
-              <a:fontRef idx="minor">
-                <a:schemeClr val="lt1"/>
-              </a:fontRef>
-            </p:style>
-            <p:txBody>
-              <a:bodyPr rot="0" spcFirstLastPara="0" vertOverflow="overflow" horzOverflow="overflow" vert="horz" wrap="square" lIns="91440" tIns="45720" rIns="91440" bIns="45720" numCol="1" spcCol="0" rtlCol="0" fromWordArt="0" anchor="ctr" anchorCtr="0" forceAA="0" compatLnSpc="1">
-                <a:prstTxWarp prst="textNoShape">
-                  <a:avLst/>
-                </a:prstTxWarp>
-                <a:noAutofit/>
-              </a:bodyPr>
-              <a:lstStyle/>
-              <a:p>
-                <a:pPr algn="ctr"/>
-                <a:endParaRPr lang="en-GB">
-                  <a:solidFill>
-                    <a:schemeClr val="accent1">
-                      <a:alpha val="0"/>
-                    </a:schemeClr>
-                  </a:solidFill>
-                </a:endParaRPr>
-              </a:p>
-            </p:txBody>
-          </p:sp>
-          <p:sp>
-            <p:nvSpPr>
-              <p:cNvPr id="220" name="Rounded Rectangle 219">
-                <a:extLst>
-                  <a:ext uri="{FF2B5EF4-FFF2-40B4-BE49-F238E27FC236}">
-                    <a16:creationId xmlns:a16="http://schemas.microsoft.com/office/drawing/2014/main" id="{BFF91D90-E514-5247-A793-6922331F88D7}"/>
-                  </a:ext>
-                </a:extLst>
-              </p:cNvPr>
-              <p:cNvSpPr/>
-              <p:nvPr/>
-            </p:nvSpPr>
-            <p:spPr>
-              <a:xfrm>
-                <a:off x="2193903" y="5752752"/>
-                <a:ext cx="351314" cy="1262483"/>
-              </a:xfrm>
-              <a:prstGeom prst="roundRect">
-                <a:avLst>
-                  <a:gd name="adj" fmla="val 4749"/>
-                </a:avLst>
-              </a:prstGeom>
-              <a:solidFill>
-                <a:srgbClr val="F8CC9A"/>
-              </a:solidFill>
-              <a:ln>
-                <a:noFill/>
-              </a:ln>
-            </p:spPr>
-            <p:style>
-              <a:lnRef idx="2">
-                <a:schemeClr val="accent1">
-                  <a:shade val="50000"/>
-                </a:schemeClr>
-              </a:lnRef>
-              <a:fillRef idx="1">
-                <a:schemeClr val="accent1"/>
-              </a:fillRef>
-              <a:effectRef idx="0">
-                <a:schemeClr val="accent1"/>
-              </a:effectRef>
-              <a:fontRef idx="minor">
-                <a:schemeClr val="lt1"/>
-              </a:fontRef>
-            </p:style>
-            <p:txBody>
-              <a:bodyPr rot="0" spcFirstLastPara="0" vertOverflow="overflow" horzOverflow="overflow" vert="horz" wrap="square" lIns="91440" tIns="45720" rIns="91440" bIns="45720" numCol="1" spcCol="0" rtlCol="0" fromWordArt="0" anchor="ctr" anchorCtr="0" forceAA="0" compatLnSpc="1">
-                <a:prstTxWarp prst="textNoShape">
-                  <a:avLst/>
-                </a:prstTxWarp>
-                <a:noAutofit/>
-              </a:bodyPr>
-              <a:lstStyle/>
-              <a:p>
-                <a:pPr algn="ctr"/>
-                <a:endParaRPr lang="en-GB" dirty="0">
-                  <a:solidFill>
-                    <a:schemeClr val="accent1">
-                      <a:alpha val="0"/>
-                    </a:schemeClr>
-                  </a:solidFill>
-                </a:endParaRPr>
-              </a:p>
-            </p:txBody>
-          </p:sp>
-          <p:sp>
-            <p:nvSpPr>
-              <p:cNvPr id="221" name="Oval 220">
-                <a:extLst>
-                  <a:ext uri="{FF2B5EF4-FFF2-40B4-BE49-F238E27FC236}">
-                    <a16:creationId xmlns:a16="http://schemas.microsoft.com/office/drawing/2014/main" id="{7D119F9F-470E-F04B-B813-723847A39CC5}"/>
-                  </a:ext>
-                </a:extLst>
-              </p:cNvPr>
-              <p:cNvSpPr/>
-              <p:nvPr/>
-            </p:nvSpPr>
-            <p:spPr>
-              <a:xfrm>
-                <a:off x="2120390" y="5754226"/>
-                <a:ext cx="152302" cy="1324151"/>
-              </a:xfrm>
-              <a:prstGeom prst="ellipse">
-                <a:avLst/>
-              </a:prstGeom>
-              <a:solidFill>
-                <a:srgbClr val="F8CC9A"/>
-              </a:solidFill>
-              <a:ln>
-                <a:noFill/>
-              </a:ln>
-            </p:spPr>
-            <p:style>
-              <a:lnRef idx="2">
-                <a:schemeClr val="accent1">
-                  <a:shade val="50000"/>
-                </a:schemeClr>
-              </a:lnRef>
-              <a:fillRef idx="1">
-                <a:schemeClr val="accent1"/>
-              </a:fillRef>
-              <a:effectRef idx="0">
-                <a:schemeClr val="accent1"/>
-              </a:effectRef>
-              <a:fontRef idx="minor">
-                <a:schemeClr val="lt1"/>
-              </a:fontRef>
-            </p:style>
-            <p:txBody>
-              <a:bodyPr rot="0" spcFirstLastPara="0" vertOverflow="overflow" horzOverflow="overflow" vert="horz" wrap="square" lIns="91440" tIns="45720" rIns="91440" bIns="45720" numCol="1" spcCol="0" rtlCol="0" fromWordArt="0" anchor="ctr" anchorCtr="0" forceAA="0" compatLnSpc="1">
-                <a:prstTxWarp prst="textNoShape">
-                  <a:avLst/>
-                </a:prstTxWarp>
-                <a:noAutofit/>
-              </a:bodyPr>
-              <a:lstStyle/>
-              <a:p>
-                <a:pPr algn="ctr"/>
-                <a:endParaRPr lang="en-GB">
-                  <a:solidFill>
-                    <a:schemeClr val="accent1">
-                      <a:alpha val="0"/>
-                    </a:schemeClr>
-                  </a:solidFill>
-                </a:endParaRPr>
-              </a:p>
-            </p:txBody>
-          </p:sp>
-          <p:sp>
-            <p:nvSpPr>
-              <p:cNvPr id="222" name="Oval 221">
-                <a:extLst>
-                  <a:ext uri="{FF2B5EF4-FFF2-40B4-BE49-F238E27FC236}">
-                    <a16:creationId xmlns:a16="http://schemas.microsoft.com/office/drawing/2014/main" id="{27A18EB4-2F54-2E4E-8296-885DFE86B4BC}"/>
-                  </a:ext>
-                </a:extLst>
-              </p:cNvPr>
-              <p:cNvSpPr/>
-              <p:nvPr/>
-            </p:nvSpPr>
-            <p:spPr>
-              <a:xfrm>
-                <a:off x="2461019" y="5751826"/>
-                <a:ext cx="152302" cy="1324151"/>
-              </a:xfrm>
-              <a:prstGeom prst="ellipse">
-                <a:avLst/>
-              </a:prstGeom>
-              <a:solidFill>
-                <a:srgbClr val="F8CC9A"/>
-              </a:solidFill>
-              <a:ln>
-                <a:noFill/>
-              </a:ln>
-            </p:spPr>
-            <p:style>
-              <a:lnRef idx="2">
-                <a:schemeClr val="accent1">
-                  <a:shade val="50000"/>
-                </a:schemeClr>
-              </a:lnRef>
-              <a:fillRef idx="1">
-                <a:schemeClr val="accent1"/>
-              </a:fillRef>
-              <a:effectRef idx="0">
-                <a:schemeClr val="accent1"/>
-              </a:effectRef>
-              <a:fontRef idx="minor">
-                <a:schemeClr val="lt1"/>
-              </a:fontRef>
-            </p:style>
-            <p:txBody>
-              <a:bodyPr rot="0" spcFirstLastPara="0" vertOverflow="overflow" horzOverflow="overflow" vert="horz" wrap="square" lIns="91440" tIns="45720" rIns="91440" bIns="45720" numCol="1" spcCol="0" rtlCol="0" fromWordArt="0" anchor="ctr" anchorCtr="0" forceAA="0" compatLnSpc="1">
-                <a:prstTxWarp prst="textNoShape">
-                  <a:avLst/>
-                </a:prstTxWarp>
-                <a:noAutofit/>
-              </a:bodyPr>
-              <a:lstStyle/>
-              <a:p>
-                <a:pPr algn="ctr"/>
-                <a:endParaRPr lang="en-GB">
-                  <a:solidFill>
-                    <a:schemeClr val="accent1">
-                      <a:alpha val="0"/>
-                    </a:schemeClr>
-                  </a:solidFill>
-                </a:endParaRPr>
-              </a:p>
-            </p:txBody>
-          </p:sp>
-          <p:sp>
-            <p:nvSpPr>
-              <p:cNvPr id="223" name="Oval 222">
-                <a:extLst>
-                  <a:ext uri="{FF2B5EF4-FFF2-40B4-BE49-F238E27FC236}">
-                    <a16:creationId xmlns:a16="http://schemas.microsoft.com/office/drawing/2014/main" id="{5C29AE27-F386-014E-BB41-F6FB8498DA0A}"/>
-                  </a:ext>
-                </a:extLst>
-              </p:cNvPr>
-              <p:cNvSpPr>
-                <a:spLocks noChangeAspect="1"/>
-              </p:cNvSpPr>
-              <p:nvPr/>
-            </p:nvSpPr>
-            <p:spPr>
-              <a:xfrm>
-                <a:off x="2152708" y="6723163"/>
-                <a:ext cx="436961" cy="487712"/>
-              </a:xfrm>
-              <a:prstGeom prst="ellipse">
-                <a:avLst/>
-              </a:prstGeom>
-              <a:solidFill>
-                <a:srgbClr val="F8CC9A"/>
-              </a:solidFill>
-              <a:ln>
-                <a:noFill/>
-              </a:ln>
-            </p:spPr>
-            <p:style>
-              <a:lnRef idx="2">
-                <a:schemeClr val="accent1">
-                  <a:shade val="50000"/>
-                </a:schemeClr>
-              </a:lnRef>
-              <a:fillRef idx="1">
-                <a:schemeClr val="accent1"/>
-              </a:fillRef>
-              <a:effectRef idx="0">
-                <a:schemeClr val="accent1"/>
-              </a:effectRef>
-              <a:fontRef idx="minor">
-                <a:schemeClr val="lt1"/>
-              </a:fontRef>
-            </p:style>
-            <p:txBody>
-              <a:bodyPr rot="0" spcFirstLastPara="0" vertOverflow="overflow" horzOverflow="overflow" vert="horz" wrap="square" lIns="91440" tIns="45720" rIns="91440" bIns="45720" numCol="1" spcCol="0" rtlCol="0" fromWordArt="0" anchor="ctr" anchorCtr="0" forceAA="0" compatLnSpc="1">
-                <a:prstTxWarp prst="textNoShape">
-                  <a:avLst/>
-                </a:prstTxWarp>
-                <a:noAutofit/>
-              </a:bodyPr>
-              <a:lstStyle/>
-              <a:p>
-                <a:pPr algn="ctr"/>
-                <a:endParaRPr lang="en-GB" dirty="0">
-                  <a:solidFill>
-                    <a:schemeClr val="accent1">
-                      <a:alpha val="0"/>
-                    </a:schemeClr>
-                  </a:solidFill>
-                </a:endParaRPr>
-              </a:p>
-            </p:txBody>
-          </p:sp>
-        </p:grpSp>
-        <p:sp>
-          <p:nvSpPr>
-            <p:cNvPr id="205" name="Rectangle 204">
-              <a:extLst>
-                <a:ext uri="{FF2B5EF4-FFF2-40B4-BE49-F238E27FC236}">
-                  <a16:creationId xmlns:a16="http://schemas.microsoft.com/office/drawing/2014/main" id="{F8273D1C-FDFD-C041-8C2B-3F4A71326F46}"/>
-                </a:ext>
-              </a:extLst>
-            </p:cNvPr>
-            <p:cNvSpPr/>
-            <p:nvPr/>
-          </p:nvSpPr>
-          <p:spPr>
-            <a:xfrm>
-              <a:off x="2374404" y="6242291"/>
-              <a:ext cx="295900" cy="432262"/>
-            </a:xfrm>
-            <a:prstGeom prst="rect">
-              <a:avLst/>
-            </a:prstGeom>
-          </p:spPr>
-          <p:style>
-            <a:lnRef idx="2">
-              <a:schemeClr val="accent1">
-                <a:shade val="50000"/>
-              </a:schemeClr>
-            </a:lnRef>
-            <a:fillRef idx="1">
-              <a:schemeClr val="accent1"/>
-            </a:fillRef>
-            <a:effectRef idx="0">
-              <a:schemeClr val="accent1"/>
-            </a:effectRef>
-            <a:fontRef idx="minor">
-              <a:schemeClr val="lt1"/>
-            </a:fontRef>
-          </p:style>
-          <p:txBody>
-            <a:bodyPr rtlCol="0" anchor="ctr"/>
-            <a:lstStyle/>
-            <a:p>
-              <a:pPr algn="ctr"/>
-              <a:endParaRPr lang="en-GB"/>
-            </a:p>
-          </p:txBody>
-        </p:sp>
-        <p:sp>
-          <p:nvSpPr>
-            <p:cNvPr id="206" name="Rectangle 205">
-              <a:extLst>
-                <a:ext uri="{FF2B5EF4-FFF2-40B4-BE49-F238E27FC236}">
-                  <a16:creationId xmlns:a16="http://schemas.microsoft.com/office/drawing/2014/main" id="{F47C6822-2E48-6B4D-A0E6-FF1C12A2F5BF}"/>
-                </a:ext>
-              </a:extLst>
-            </p:cNvPr>
-            <p:cNvSpPr/>
-            <p:nvPr/>
-          </p:nvSpPr>
-          <p:spPr>
-            <a:xfrm>
-              <a:off x="2776233" y="6044855"/>
-              <a:ext cx="295900" cy="432262"/>
-            </a:xfrm>
-            <a:prstGeom prst="rect">
-              <a:avLst/>
-            </a:prstGeom>
-          </p:spPr>
-          <p:style>
-            <a:lnRef idx="2">
-              <a:schemeClr val="accent1">
-                <a:shade val="50000"/>
-              </a:schemeClr>
-            </a:lnRef>
-            <a:fillRef idx="1">
-              <a:schemeClr val="accent1"/>
-            </a:fillRef>
-            <a:effectRef idx="0">
-              <a:schemeClr val="accent1"/>
-            </a:effectRef>
-            <a:fontRef idx="minor">
-              <a:schemeClr val="lt1"/>
-            </a:fontRef>
-          </p:style>
-          <p:txBody>
-            <a:bodyPr rtlCol="0" anchor="ctr"/>
-            <a:lstStyle/>
-            <a:p>
-              <a:pPr algn="ctr"/>
-              <a:endParaRPr lang="en-GB"/>
-            </a:p>
-          </p:txBody>
-        </p:sp>
-        <p:sp>
-          <p:nvSpPr>
-            <p:cNvPr id="207" name="Rectangle 206">
-              <a:extLst>
-                <a:ext uri="{FF2B5EF4-FFF2-40B4-BE49-F238E27FC236}">
-                  <a16:creationId xmlns:a16="http://schemas.microsoft.com/office/drawing/2014/main" id="{F5064156-14F4-224B-A7A3-8E9282A4619E}"/>
-                </a:ext>
-              </a:extLst>
-            </p:cNvPr>
-            <p:cNvSpPr/>
-            <p:nvPr/>
-          </p:nvSpPr>
-          <p:spPr>
-            <a:xfrm>
-              <a:off x="3167074" y="6052848"/>
-              <a:ext cx="295900" cy="432262"/>
-            </a:xfrm>
-            <a:prstGeom prst="rect">
-              <a:avLst/>
-            </a:prstGeom>
-          </p:spPr>
-          <p:style>
-            <a:lnRef idx="2">
-              <a:schemeClr val="accent1">
-                <a:shade val="50000"/>
-              </a:schemeClr>
-            </a:lnRef>
-            <a:fillRef idx="1">
-              <a:schemeClr val="accent1"/>
-            </a:fillRef>
-            <a:effectRef idx="0">
-              <a:schemeClr val="accent1"/>
-            </a:effectRef>
-            <a:fontRef idx="minor">
-              <a:schemeClr val="lt1"/>
-            </a:fontRef>
-          </p:style>
-          <p:txBody>
-            <a:bodyPr rtlCol="0" anchor="ctr"/>
-            <a:lstStyle/>
-            <a:p>
-              <a:pPr algn="ctr"/>
-              <a:endParaRPr lang="en-GB"/>
-            </a:p>
-          </p:txBody>
-        </p:sp>
-        <p:sp>
-          <p:nvSpPr>
-            <p:cNvPr id="208" name="Oval 207">
-              <a:extLst>
-                <a:ext uri="{FF2B5EF4-FFF2-40B4-BE49-F238E27FC236}">
-                  <a16:creationId xmlns:a16="http://schemas.microsoft.com/office/drawing/2014/main" id="{0A36B865-F3C3-3A49-98DF-FC00B33C7F50}"/>
-                </a:ext>
-              </a:extLst>
-            </p:cNvPr>
-            <p:cNvSpPr/>
-            <p:nvPr/>
-          </p:nvSpPr>
-          <p:spPr>
-            <a:xfrm>
-              <a:off x="2441083" y="6236034"/>
-              <a:ext cx="1391511" cy="1079864"/>
-            </a:xfrm>
-            <a:prstGeom prst="ellipse">
-              <a:avLst/>
-            </a:prstGeom>
-            <a:noFill/>
-            <a:ln w="50800"/>
-          </p:spPr>
-          <p:style>
-            <a:lnRef idx="2">
-              <a:schemeClr val="accent1">
-                <a:shade val="50000"/>
-              </a:schemeClr>
-            </a:lnRef>
-            <a:fillRef idx="1">
-              <a:schemeClr val="accent1"/>
-            </a:fillRef>
-            <a:effectRef idx="0">
-              <a:schemeClr val="accent1"/>
-            </a:effectRef>
-            <a:fontRef idx="minor">
-              <a:schemeClr val="lt1"/>
-            </a:fontRef>
-          </p:style>
-          <p:txBody>
-            <a:bodyPr rtlCol="0" anchor="ctr"/>
-            <a:lstStyle/>
-            <a:p>
-              <a:pPr algn="ctr"/>
-              <a:endParaRPr lang="en-GB"/>
-            </a:p>
-          </p:txBody>
-        </p:sp>
-        <p:sp>
-          <p:nvSpPr>
-            <p:cNvPr id="209" name="Rounded Rectangle 208">
-              <a:extLst>
-                <a:ext uri="{FF2B5EF4-FFF2-40B4-BE49-F238E27FC236}">
-                  <a16:creationId xmlns:a16="http://schemas.microsoft.com/office/drawing/2014/main" id="{D1B5740E-6AA3-D74F-835B-677BC4AC5876}"/>
-                </a:ext>
-              </a:extLst>
-            </p:cNvPr>
-            <p:cNvSpPr/>
-            <p:nvPr/>
-          </p:nvSpPr>
-          <p:spPr>
-            <a:xfrm>
-              <a:off x="3500272" y="6289912"/>
-              <a:ext cx="140265" cy="66061"/>
-            </a:xfrm>
-            <a:prstGeom prst="roundRect">
-              <a:avLst>
-                <a:gd name="adj" fmla="val 4749"/>
-              </a:avLst>
-            </a:prstGeom>
-            <a:solidFill>
-              <a:srgbClr val="D7AE85">
-                <a:alpha val="68000"/>
-              </a:srgbClr>
-            </a:solidFill>
-            <a:ln>
-              <a:noFill/>
-            </a:ln>
-          </p:spPr>
-          <p:style>
-            <a:lnRef idx="2">
-              <a:schemeClr val="accent1">
-                <a:shade val="50000"/>
-              </a:schemeClr>
-            </a:lnRef>
-            <a:fillRef idx="1">
-              <a:schemeClr val="accent1"/>
-            </a:fillRef>
-            <a:effectRef idx="0">
-              <a:schemeClr val="accent1"/>
-            </a:effectRef>
-            <a:fontRef idx="minor">
-              <a:schemeClr val="lt1"/>
-            </a:fontRef>
-          </p:style>
-          <p:txBody>
-            <a:bodyPr rot="0" spcFirstLastPara="0" vertOverflow="overflow" horzOverflow="overflow" vert="horz" wrap="square" lIns="91440" tIns="45720" rIns="91440" bIns="45720" numCol="1" spcCol="0" rtlCol="0" fromWordArt="0" anchor="ctr" anchorCtr="0" forceAA="0" compatLnSpc="1">
-              <a:prstTxWarp prst="textNoShape">
-                <a:avLst/>
-              </a:prstTxWarp>
-              <a:noAutofit/>
-            </a:bodyPr>
-            <a:lstStyle/>
-            <a:p>
-              <a:pPr algn="ctr"/>
-              <a:endParaRPr lang="en-GB" dirty="0">
-                <a:solidFill>
-                  <a:schemeClr val="accent1">
-                    <a:alpha val="0"/>
-                  </a:schemeClr>
-                </a:solidFill>
-              </a:endParaRPr>
-            </a:p>
-          </p:txBody>
-        </p:sp>
-        <p:sp>
-          <p:nvSpPr>
-            <p:cNvPr id="210" name="Rounded Rectangle 209">
-              <a:extLst>
-                <a:ext uri="{FF2B5EF4-FFF2-40B4-BE49-F238E27FC236}">
-                  <a16:creationId xmlns:a16="http://schemas.microsoft.com/office/drawing/2014/main" id="{E9B90E2B-4EEE-5944-AE6A-2D098B2EEBB5}"/>
-                </a:ext>
-              </a:extLst>
-            </p:cNvPr>
-            <p:cNvSpPr/>
-            <p:nvPr/>
-          </p:nvSpPr>
-          <p:spPr>
-            <a:xfrm>
-              <a:off x="3528237" y="6355973"/>
-              <a:ext cx="106641" cy="155516"/>
-            </a:xfrm>
-            <a:prstGeom prst="roundRect">
-              <a:avLst>
-                <a:gd name="adj" fmla="val 4749"/>
-              </a:avLst>
-            </a:prstGeom>
-            <a:solidFill>
-              <a:srgbClr val="D7AE85">
-                <a:alpha val="68000"/>
-              </a:srgbClr>
-            </a:solidFill>
-            <a:ln>
-              <a:noFill/>
-            </a:ln>
-          </p:spPr>
-          <p:style>
-            <a:lnRef idx="2">
-              <a:schemeClr val="accent1">
-                <a:shade val="50000"/>
-              </a:schemeClr>
-            </a:lnRef>
-            <a:fillRef idx="1">
-              <a:schemeClr val="accent1"/>
-            </a:fillRef>
-            <a:effectRef idx="0">
-              <a:schemeClr val="accent1"/>
-            </a:effectRef>
-            <a:fontRef idx="minor">
-              <a:schemeClr val="lt1"/>
-            </a:fontRef>
-          </p:style>
-          <p:txBody>
-            <a:bodyPr rot="0" spcFirstLastPara="0" vertOverflow="overflow" horzOverflow="overflow" vert="horz" wrap="square" lIns="91440" tIns="45720" rIns="91440" bIns="45720" numCol="1" spcCol="0" rtlCol="0" fromWordArt="0" anchor="ctr" anchorCtr="0" forceAA="0" compatLnSpc="1">
-              <a:prstTxWarp prst="textNoShape">
-                <a:avLst/>
-              </a:prstTxWarp>
-              <a:noAutofit/>
-            </a:bodyPr>
-            <a:lstStyle/>
-            <a:p>
-              <a:pPr algn="ctr"/>
-              <a:endParaRPr lang="en-GB" dirty="0">
-                <a:solidFill>
-                  <a:schemeClr val="accent1">
-                    <a:alpha val="0"/>
-                  </a:schemeClr>
-                </a:solidFill>
-              </a:endParaRPr>
-            </a:p>
-          </p:txBody>
-        </p:sp>
-        <p:sp>
-          <p:nvSpPr>
-            <p:cNvPr id="211" name="Rounded Rectangle 210">
-              <a:extLst>
-                <a:ext uri="{FF2B5EF4-FFF2-40B4-BE49-F238E27FC236}">
-                  <a16:creationId xmlns:a16="http://schemas.microsoft.com/office/drawing/2014/main" id="{5474CB09-30EE-0D4F-9A3A-D313D178F018}"/>
-                </a:ext>
-              </a:extLst>
-            </p:cNvPr>
-            <p:cNvSpPr/>
-            <p:nvPr/>
-          </p:nvSpPr>
-          <p:spPr>
-            <a:xfrm>
-              <a:off x="2678074" y="5992941"/>
-              <a:ext cx="814428" cy="282299"/>
-            </a:xfrm>
-            <a:prstGeom prst="roundRect">
-              <a:avLst>
-                <a:gd name="adj" fmla="val 4749"/>
-              </a:avLst>
-            </a:prstGeom>
-            <a:solidFill>
-              <a:srgbClr val="F8CC9A">
-                <a:alpha val="68000"/>
-              </a:srgbClr>
-            </a:solidFill>
-            <a:ln>
-              <a:noFill/>
-            </a:ln>
-          </p:spPr>
-          <p:style>
-            <a:lnRef idx="2">
-              <a:schemeClr val="accent1">
-                <a:shade val="50000"/>
-              </a:schemeClr>
-            </a:lnRef>
-            <a:fillRef idx="1">
-              <a:schemeClr val="accent1"/>
-            </a:fillRef>
-            <a:effectRef idx="0">
-              <a:schemeClr val="accent1"/>
-            </a:effectRef>
-            <a:fontRef idx="minor">
-              <a:schemeClr val="lt1"/>
-            </a:fontRef>
-          </p:style>
-          <p:txBody>
-            <a:bodyPr rot="0" spcFirstLastPara="0" vertOverflow="overflow" horzOverflow="overflow" vert="horz" wrap="square" lIns="91440" tIns="45720" rIns="91440" bIns="45720" numCol="1" spcCol="0" rtlCol="0" fromWordArt="0" anchor="ctr" anchorCtr="0" forceAA="0" compatLnSpc="1">
-              <a:prstTxWarp prst="textNoShape">
-                <a:avLst/>
-              </a:prstTxWarp>
-              <a:noAutofit/>
-            </a:bodyPr>
-            <a:lstStyle/>
-            <a:p>
-              <a:pPr algn="ctr"/>
-              <a:endParaRPr lang="en-GB" dirty="0">
-                <a:solidFill>
-                  <a:schemeClr val="accent1">
-                    <a:alpha val="0"/>
-                  </a:schemeClr>
-                </a:solidFill>
-              </a:endParaRPr>
-            </a:p>
-          </p:txBody>
-        </p:sp>
-        <p:sp>
-          <p:nvSpPr>
-            <p:cNvPr id="212" name="Rounded Rectangle 211">
-              <a:extLst>
-                <a:ext uri="{FF2B5EF4-FFF2-40B4-BE49-F238E27FC236}">
-                  <a16:creationId xmlns:a16="http://schemas.microsoft.com/office/drawing/2014/main" id="{A394A6EB-87BC-564B-841D-0391B2DC9548}"/>
-                </a:ext>
-              </a:extLst>
-            </p:cNvPr>
-            <p:cNvSpPr/>
-            <p:nvPr/>
-          </p:nvSpPr>
-          <p:spPr>
-            <a:xfrm>
-              <a:off x="2674189" y="6275874"/>
-              <a:ext cx="831118" cy="235614"/>
-            </a:xfrm>
-            <a:prstGeom prst="roundRect">
-              <a:avLst>
-                <a:gd name="adj" fmla="val 4749"/>
-              </a:avLst>
-            </a:prstGeom>
-            <a:solidFill>
-              <a:srgbClr val="F8CC9A">
-                <a:alpha val="68000"/>
-              </a:srgbClr>
-            </a:solidFill>
-            <a:ln>
-              <a:noFill/>
-            </a:ln>
-          </p:spPr>
-          <p:style>
-            <a:lnRef idx="2">
-              <a:schemeClr val="accent1">
-                <a:shade val="50000"/>
-              </a:schemeClr>
-            </a:lnRef>
-            <a:fillRef idx="1">
-              <a:schemeClr val="accent1"/>
-            </a:fillRef>
-            <a:effectRef idx="0">
-              <a:schemeClr val="accent1"/>
-            </a:effectRef>
-            <a:fontRef idx="minor">
-              <a:schemeClr val="lt1"/>
-            </a:fontRef>
-          </p:style>
-          <p:txBody>
-            <a:bodyPr rot="0" spcFirstLastPara="0" vertOverflow="overflow" horzOverflow="overflow" vert="horz" wrap="square" lIns="91440" tIns="45720" rIns="91440" bIns="45720" numCol="1" spcCol="0" rtlCol="0" fromWordArt="0" anchor="ctr" anchorCtr="0" forceAA="0" compatLnSpc="1">
-              <a:prstTxWarp prst="textNoShape">
-                <a:avLst/>
-              </a:prstTxWarp>
-              <a:noAutofit/>
-            </a:bodyPr>
-            <a:lstStyle/>
-            <a:p>
-              <a:pPr algn="ctr"/>
-              <a:endParaRPr lang="en-GB" dirty="0">
-                <a:solidFill>
-                  <a:schemeClr val="accent1">
-                    <a:alpha val="0"/>
-                  </a:schemeClr>
-                </a:solidFill>
-              </a:endParaRPr>
-            </a:p>
-          </p:txBody>
-        </p:sp>
-        <p:sp>
-          <p:nvSpPr>
-            <p:cNvPr id="213" name="Rounded Rectangle 212">
-              <a:extLst>
-                <a:ext uri="{FF2B5EF4-FFF2-40B4-BE49-F238E27FC236}">
-                  <a16:creationId xmlns:a16="http://schemas.microsoft.com/office/drawing/2014/main" id="{14B5F8B4-1618-164D-A23A-B1E11CAF3865}"/>
-                </a:ext>
-              </a:extLst>
-            </p:cNvPr>
-            <p:cNvSpPr/>
-            <p:nvPr/>
-          </p:nvSpPr>
-          <p:spPr>
-            <a:xfrm>
-              <a:off x="2592320" y="6221274"/>
-              <a:ext cx="84157" cy="513496"/>
-            </a:xfrm>
-            <a:prstGeom prst="roundRect">
-              <a:avLst>
-                <a:gd name="adj" fmla="val 4749"/>
-              </a:avLst>
-            </a:prstGeom>
-            <a:solidFill>
-              <a:srgbClr val="F8CC9A">
-                <a:alpha val="68000"/>
-              </a:srgbClr>
-            </a:solidFill>
-            <a:ln>
-              <a:noFill/>
-            </a:ln>
-          </p:spPr>
-          <p:style>
-            <a:lnRef idx="2">
-              <a:schemeClr val="accent1">
-                <a:shade val="50000"/>
-              </a:schemeClr>
-            </a:lnRef>
-            <a:fillRef idx="1">
-              <a:schemeClr val="accent1"/>
-            </a:fillRef>
-            <a:effectRef idx="0">
-              <a:schemeClr val="accent1"/>
-            </a:effectRef>
-            <a:fontRef idx="minor">
-              <a:schemeClr val="lt1"/>
-            </a:fontRef>
-          </p:style>
-          <p:txBody>
-            <a:bodyPr rot="0" spcFirstLastPara="0" vertOverflow="overflow" horzOverflow="overflow" vert="horz" wrap="square" lIns="91440" tIns="45720" rIns="91440" bIns="45720" numCol="1" spcCol="0" rtlCol="0" fromWordArt="0" anchor="ctr" anchorCtr="0" forceAA="0" compatLnSpc="1">
-              <a:prstTxWarp prst="textNoShape">
-                <a:avLst/>
-              </a:prstTxWarp>
-              <a:noAutofit/>
-            </a:bodyPr>
-            <a:lstStyle/>
-            <a:p>
-              <a:pPr algn="ctr"/>
-              <a:endParaRPr lang="en-GB" dirty="0">
-                <a:solidFill>
-                  <a:schemeClr val="accent1">
-                    <a:alpha val="0"/>
-                  </a:schemeClr>
-                </a:solidFill>
-              </a:endParaRPr>
-            </a:p>
-          </p:txBody>
-        </p:sp>
-        <p:sp>
-          <p:nvSpPr>
-            <p:cNvPr id="214" name="Rectangle 213">
-              <a:extLst>
-                <a:ext uri="{FF2B5EF4-FFF2-40B4-BE49-F238E27FC236}">
-                  <a16:creationId xmlns:a16="http://schemas.microsoft.com/office/drawing/2014/main" id="{D8BCE5D2-21C4-FE4E-B190-E0F4AFD9652F}"/>
-                </a:ext>
-              </a:extLst>
-            </p:cNvPr>
-            <p:cNvSpPr/>
-            <p:nvPr/>
-          </p:nvSpPr>
-          <p:spPr>
-            <a:xfrm>
-              <a:off x="3573543" y="6761569"/>
-              <a:ext cx="295900" cy="432262"/>
-            </a:xfrm>
-            <a:prstGeom prst="rect">
-              <a:avLst/>
-            </a:prstGeom>
-            <a:solidFill>
-              <a:srgbClr val="C00000"/>
-            </a:solidFill>
-          </p:spPr>
-          <p:style>
-            <a:lnRef idx="2">
-              <a:schemeClr val="accent1">
-                <a:shade val="50000"/>
-              </a:schemeClr>
-            </a:lnRef>
-            <a:fillRef idx="1">
-              <a:schemeClr val="accent1"/>
-            </a:fillRef>
-            <a:effectRef idx="0">
-              <a:schemeClr val="accent1"/>
-            </a:effectRef>
-            <a:fontRef idx="minor">
-              <a:schemeClr val="lt1"/>
-            </a:fontRef>
-          </p:style>
-          <p:txBody>
-            <a:bodyPr rtlCol="0" anchor="ctr"/>
-            <a:lstStyle/>
-            <a:p>
-              <a:pPr algn="ctr"/>
-              <a:r>
-                <a:rPr lang="en-GB" dirty="0"/>
-                <a:t>1</a:t>
-              </a:r>
-            </a:p>
-          </p:txBody>
-        </p:sp>
-        <p:sp>
-          <p:nvSpPr>
-            <p:cNvPr id="215" name="Rectangle 214">
-              <a:extLst>
-                <a:ext uri="{FF2B5EF4-FFF2-40B4-BE49-F238E27FC236}">
-                  <a16:creationId xmlns:a16="http://schemas.microsoft.com/office/drawing/2014/main" id="{19F6EB2D-FAFB-2447-BE92-F4D09B868A41}"/>
-                </a:ext>
-              </a:extLst>
-            </p:cNvPr>
-            <p:cNvSpPr/>
-            <p:nvPr/>
-          </p:nvSpPr>
-          <p:spPr>
-            <a:xfrm>
-              <a:off x="3139071" y="6983377"/>
-              <a:ext cx="295900" cy="432262"/>
-            </a:xfrm>
-            <a:prstGeom prst="rect">
-              <a:avLst/>
-            </a:prstGeom>
-          </p:spPr>
-          <p:style>
-            <a:lnRef idx="2">
-              <a:schemeClr val="accent1">
-                <a:shade val="50000"/>
-              </a:schemeClr>
-            </a:lnRef>
-            <a:fillRef idx="1">
-              <a:schemeClr val="accent1"/>
-            </a:fillRef>
-            <a:effectRef idx="0">
-              <a:schemeClr val="accent1"/>
-            </a:effectRef>
-            <a:fontRef idx="minor">
-              <a:schemeClr val="lt1"/>
-            </a:fontRef>
-          </p:style>
-          <p:txBody>
-            <a:bodyPr rtlCol="0" anchor="ctr"/>
-            <a:lstStyle/>
-            <a:p>
-              <a:pPr algn="ctr"/>
-              <a:endParaRPr lang="en-GB"/>
-            </a:p>
-          </p:txBody>
-        </p:sp>
-        <p:sp>
-          <p:nvSpPr>
-            <p:cNvPr id="216" name="Rectangle 215">
-              <a:extLst>
-                <a:ext uri="{FF2B5EF4-FFF2-40B4-BE49-F238E27FC236}">
-                  <a16:creationId xmlns:a16="http://schemas.microsoft.com/office/drawing/2014/main" id="{A105355B-EE2D-0844-9A28-D4C92305E662}"/>
-                </a:ext>
-              </a:extLst>
-            </p:cNvPr>
-            <p:cNvSpPr/>
-            <p:nvPr/>
-          </p:nvSpPr>
-          <p:spPr>
-            <a:xfrm>
-              <a:off x="2772958" y="6990326"/>
-              <a:ext cx="295900" cy="415488"/>
-            </a:xfrm>
-            <a:prstGeom prst="rect">
-              <a:avLst/>
-            </a:prstGeom>
-          </p:spPr>
-          <p:style>
-            <a:lnRef idx="2">
-              <a:schemeClr val="accent1">
-                <a:shade val="50000"/>
-              </a:schemeClr>
-            </a:lnRef>
-            <a:fillRef idx="1">
-              <a:schemeClr val="accent1"/>
-            </a:fillRef>
-            <a:effectRef idx="0">
-              <a:schemeClr val="accent1"/>
-            </a:effectRef>
-            <a:fontRef idx="minor">
-              <a:schemeClr val="lt1"/>
-            </a:fontRef>
-          </p:style>
-          <p:txBody>
-            <a:bodyPr rtlCol="0" anchor="ctr"/>
-            <a:lstStyle/>
-            <a:p>
-              <a:pPr algn="ctr"/>
-              <a:endParaRPr lang="en-GB"/>
-            </a:p>
-          </p:txBody>
-        </p:sp>
-        <p:sp>
-          <p:nvSpPr>
-            <p:cNvPr id="217" name="Rectangle 216">
-              <a:extLst>
-                <a:ext uri="{FF2B5EF4-FFF2-40B4-BE49-F238E27FC236}">
-                  <a16:creationId xmlns:a16="http://schemas.microsoft.com/office/drawing/2014/main" id="{7DE87C72-E837-574C-8BEA-1753A1583D2A}"/>
-                </a:ext>
-              </a:extLst>
-            </p:cNvPr>
-            <p:cNvSpPr/>
-            <p:nvPr/>
-          </p:nvSpPr>
-          <p:spPr>
-            <a:xfrm>
-              <a:off x="2361802" y="6767246"/>
-              <a:ext cx="295900" cy="432262"/>
-            </a:xfrm>
-            <a:prstGeom prst="rect">
-              <a:avLst/>
-            </a:prstGeom>
-          </p:spPr>
-          <p:style>
-            <a:lnRef idx="2">
-              <a:schemeClr val="accent1">
-                <a:shade val="50000"/>
-              </a:schemeClr>
-            </a:lnRef>
-            <a:fillRef idx="1">
-              <a:schemeClr val="accent1"/>
-            </a:fillRef>
-            <a:effectRef idx="0">
-              <a:schemeClr val="accent1"/>
-            </a:effectRef>
-            <a:fontRef idx="minor">
-              <a:schemeClr val="lt1"/>
-            </a:fontRef>
-          </p:style>
-          <p:txBody>
-            <a:bodyPr rtlCol="0" anchor="ctr"/>
-            <a:lstStyle/>
-            <a:p>
-              <a:pPr algn="ctr"/>
-              <a:endParaRPr lang="en-GB"/>
-            </a:p>
-          </p:txBody>
-        </p:sp>
-      </p:grpSp>
-      <p:grpSp>
-        <p:nvGrpSpPr>
-          <p:cNvPr id="268" name="Group 267">
-            <a:extLst>
-              <a:ext uri="{FF2B5EF4-FFF2-40B4-BE49-F238E27FC236}">
-                <a16:creationId xmlns:a16="http://schemas.microsoft.com/office/drawing/2014/main" id="{E2A2513A-21B4-854E-89EA-1F4B81FDD61A}"/>
-              </a:ext>
-            </a:extLst>
-          </p:cNvPr>
-          <p:cNvGrpSpPr/>
-          <p:nvPr/>
-        </p:nvGrpSpPr>
-        <p:grpSpPr>
-          <a:xfrm>
-            <a:off x="106234" y="2846962"/>
-            <a:ext cx="2856668" cy="2574839"/>
-            <a:chOff x="2361802" y="5540985"/>
-            <a:chExt cx="2856668" cy="2574839"/>
-          </a:xfrm>
-        </p:grpSpPr>
-        <p:sp>
-          <p:nvSpPr>
-            <p:cNvPr id="269" name="TextBox 268">
-              <a:extLst>
-                <a:ext uri="{FF2B5EF4-FFF2-40B4-BE49-F238E27FC236}">
-                  <a16:creationId xmlns:a16="http://schemas.microsoft.com/office/drawing/2014/main" id="{756966F0-EF88-7141-B48E-614EA5BCB165}"/>
-                </a:ext>
-              </a:extLst>
-            </p:cNvPr>
-            <p:cNvSpPr txBox="1"/>
-            <p:nvPr/>
-          </p:nvSpPr>
-          <p:spPr>
-            <a:xfrm>
-              <a:off x="2758241" y="6289913"/>
-              <a:ext cx="335989" cy="369332"/>
-            </a:xfrm>
-            <a:prstGeom prst="rect">
-              <a:avLst/>
-            </a:prstGeom>
-            <a:solidFill>
-              <a:schemeClr val="accent1">
-                <a:alpha val="96000"/>
-              </a:schemeClr>
-            </a:solidFill>
-          </p:spPr>
-          <p:txBody>
-            <a:bodyPr wrap="square" rtlCol="0">
-              <a:spAutoFit/>
-            </a:bodyPr>
-            <a:lstStyle/>
-            <a:p>
-              <a:endParaRPr lang="en-GB" dirty="0"/>
-            </a:p>
-          </p:txBody>
-        </p:sp>
-        <p:sp>
-          <p:nvSpPr>
-            <p:cNvPr id="270" name="Rectangle 269">
-              <a:extLst>
-                <a:ext uri="{FF2B5EF4-FFF2-40B4-BE49-F238E27FC236}">
-                  <a16:creationId xmlns:a16="http://schemas.microsoft.com/office/drawing/2014/main" id="{38A49E22-332F-0F44-B5C6-4EC7E498FA9A}"/>
-                </a:ext>
-              </a:extLst>
-            </p:cNvPr>
-            <p:cNvSpPr/>
-            <p:nvPr/>
-          </p:nvSpPr>
-          <p:spPr>
-            <a:xfrm>
-              <a:off x="3228312" y="6298397"/>
-              <a:ext cx="295900" cy="432262"/>
-            </a:xfrm>
-            <a:prstGeom prst="rect">
-              <a:avLst/>
-            </a:prstGeom>
-          </p:spPr>
-          <p:style>
-            <a:lnRef idx="2">
-              <a:schemeClr val="accent1">
-                <a:shade val="50000"/>
-              </a:schemeClr>
-            </a:lnRef>
-            <a:fillRef idx="1">
-              <a:schemeClr val="accent1"/>
-            </a:fillRef>
-            <a:effectRef idx="0">
-              <a:schemeClr val="accent1"/>
-            </a:effectRef>
-            <a:fontRef idx="minor">
-              <a:schemeClr val="lt1"/>
-            </a:fontRef>
-          </p:style>
-          <p:txBody>
-            <a:bodyPr rtlCol="0" anchor="ctr"/>
-            <a:lstStyle/>
-            <a:p>
-              <a:pPr algn="ctr"/>
-              <a:endParaRPr lang="en-GB"/>
-            </a:p>
-          </p:txBody>
-        </p:sp>
-        <p:grpSp>
-          <p:nvGrpSpPr>
-            <p:cNvPr id="272" name="Group 271">
-              <a:extLst>
-                <a:ext uri="{FF2B5EF4-FFF2-40B4-BE49-F238E27FC236}">
-                  <a16:creationId xmlns:a16="http://schemas.microsoft.com/office/drawing/2014/main" id="{B7F37DAF-D311-5049-B5A3-58B94754C0AE}"/>
-                </a:ext>
-              </a:extLst>
-            </p:cNvPr>
-            <p:cNvGrpSpPr>
-              <a:grpSpLocks noChangeAspect="1"/>
-            </p:cNvGrpSpPr>
-            <p:nvPr/>
-          </p:nvGrpSpPr>
-          <p:grpSpPr>
-            <a:xfrm rot="483744">
-              <a:off x="2781928" y="6273482"/>
-              <a:ext cx="2436542" cy="1629757"/>
-              <a:chOff x="4549167" y="6054246"/>
-              <a:chExt cx="1220265" cy="911014"/>
-            </a:xfrm>
-          </p:grpSpPr>
-          <p:grpSp>
-            <p:nvGrpSpPr>
-              <p:cNvPr id="293" name="Group 292">
-                <a:extLst>
-                  <a:ext uri="{FF2B5EF4-FFF2-40B4-BE49-F238E27FC236}">
-                    <a16:creationId xmlns:a16="http://schemas.microsoft.com/office/drawing/2014/main" id="{FC8DB23D-70FE-5B45-ADA3-5F7643D45691}"/>
-                  </a:ext>
-                </a:extLst>
-              </p:cNvPr>
-              <p:cNvGrpSpPr/>
-              <p:nvPr/>
-            </p:nvGrpSpPr>
-            <p:grpSpPr>
-              <a:xfrm>
-                <a:off x="4549167" y="6054246"/>
-                <a:ext cx="1169843" cy="911014"/>
-                <a:chOff x="4040986" y="6146585"/>
-                <a:chExt cx="1169843" cy="911014"/>
-              </a:xfrm>
-              <a:solidFill>
-                <a:srgbClr val="D7AE85"/>
-              </a:solidFill>
-            </p:grpSpPr>
-            <p:grpSp>
-              <p:nvGrpSpPr>
-                <p:cNvPr id="298" name="Group 297">
-                  <a:extLst>
-                    <a:ext uri="{FF2B5EF4-FFF2-40B4-BE49-F238E27FC236}">
-                      <a16:creationId xmlns:a16="http://schemas.microsoft.com/office/drawing/2014/main" id="{DE36358D-58DC-BF47-98BA-774FA97C9C0E}"/>
-                    </a:ext>
-                  </a:extLst>
-                </p:cNvPr>
-                <p:cNvGrpSpPr/>
-                <p:nvPr/>
-              </p:nvGrpSpPr>
-              <p:grpSpPr>
-                <a:xfrm>
-                  <a:off x="4040986" y="6229693"/>
-                  <a:ext cx="1169843" cy="827906"/>
-                  <a:chOff x="-1449857" y="5793212"/>
-                  <a:chExt cx="2121522" cy="1659459"/>
-                </a:xfrm>
-                <a:grpFill/>
-              </p:grpSpPr>
-              <p:sp>
-                <p:nvSpPr>
-                  <p:cNvPr id="300" name="Rounded Rectangle 299">
-                    <a:extLst>
-                      <a:ext uri="{FF2B5EF4-FFF2-40B4-BE49-F238E27FC236}">
-                        <a16:creationId xmlns:a16="http://schemas.microsoft.com/office/drawing/2014/main" id="{A1EE9997-4456-D149-B80E-422CFF99B75D}"/>
-                      </a:ext>
-                    </a:extLst>
-                  </p:cNvPr>
-                  <p:cNvSpPr/>
-                  <p:nvPr/>
-                </p:nvSpPr>
-                <p:spPr>
-                  <a:xfrm rot="14184732">
-                    <a:off x="-1112420" y="6263929"/>
-                    <a:ext cx="851305" cy="1526179"/>
-                  </a:xfrm>
-                  <a:prstGeom prst="roundRect">
-                    <a:avLst>
-                      <a:gd name="adj" fmla="val 26385"/>
-                    </a:avLst>
-                  </a:prstGeom>
-                  <a:grpFill/>
-                  <a:ln>
-                    <a:noFill/>
-                  </a:ln>
-                </p:spPr>
-                <p:style>
-                  <a:lnRef idx="2">
-                    <a:schemeClr val="accent1">
-                      <a:shade val="50000"/>
-                    </a:schemeClr>
-                  </a:lnRef>
-                  <a:fillRef idx="1">
-                    <a:schemeClr val="accent1"/>
-                  </a:fillRef>
-                  <a:effectRef idx="0">
-                    <a:schemeClr val="accent1"/>
-                  </a:effectRef>
-                  <a:fontRef idx="minor">
-                    <a:schemeClr val="lt1"/>
-                  </a:fontRef>
-                </p:style>
-                <p:txBody>
-                  <a:bodyPr rot="0" spcFirstLastPara="0" vertOverflow="overflow" horzOverflow="overflow" vert="horz" wrap="square" lIns="91440" tIns="45720" rIns="91440" bIns="45720" numCol="1" spcCol="0" rtlCol="0" fromWordArt="0" anchor="ctr" anchorCtr="0" forceAA="0" compatLnSpc="1">
-                    <a:prstTxWarp prst="textNoShape">
-                      <a:avLst/>
-                    </a:prstTxWarp>
-                    <a:noAutofit/>
-                  </a:bodyPr>
-                  <a:lstStyle/>
-                  <a:p>
-                    <a:pPr algn="ctr"/>
-                    <a:endParaRPr lang="en-GB"/>
-                  </a:p>
-                </p:txBody>
-              </p:sp>
-              <p:sp>
-                <p:nvSpPr>
-                  <p:cNvPr id="301" name="Rounded Rectangle 300">
-                    <a:extLst>
-                      <a:ext uri="{FF2B5EF4-FFF2-40B4-BE49-F238E27FC236}">
-                        <a16:creationId xmlns:a16="http://schemas.microsoft.com/office/drawing/2014/main" id="{889AFDFE-2B02-CF45-B1F4-11381BE58EB7}"/>
-                      </a:ext>
-                    </a:extLst>
-                  </p:cNvPr>
-                  <p:cNvSpPr/>
-                  <p:nvPr/>
-                </p:nvSpPr>
-                <p:spPr>
-                  <a:xfrm rot="13845605">
-                    <a:off x="-288116" y="5831893"/>
-                    <a:ext cx="998461" cy="921100"/>
-                  </a:xfrm>
-                  <a:prstGeom prst="roundRect">
-                    <a:avLst>
-                      <a:gd name="adj" fmla="val 41216"/>
-                    </a:avLst>
-                  </a:prstGeom>
-                  <a:grpFill/>
-                  <a:ln>
-                    <a:noFill/>
-                  </a:ln>
-                </p:spPr>
-                <p:style>
-                  <a:lnRef idx="2">
-                    <a:schemeClr val="accent1">
-                      <a:shade val="50000"/>
-                    </a:schemeClr>
-                  </a:lnRef>
-                  <a:fillRef idx="1">
-                    <a:schemeClr val="accent1"/>
-                  </a:fillRef>
-                  <a:effectRef idx="0">
-                    <a:schemeClr val="accent1"/>
-                  </a:effectRef>
-                  <a:fontRef idx="minor">
-                    <a:schemeClr val="lt1"/>
-                  </a:fontRef>
-                </p:style>
-                <p:txBody>
-                  <a:bodyPr rot="0" spcFirstLastPara="0" vertOverflow="overflow" horzOverflow="overflow" vert="horz" wrap="square" lIns="91440" tIns="45720" rIns="91440" bIns="45720" numCol="1" spcCol="0" rtlCol="0" fromWordArt="0" anchor="ctr" anchorCtr="0" forceAA="0" compatLnSpc="1">
-                    <a:prstTxWarp prst="textNoShape">
-                      <a:avLst/>
-                    </a:prstTxWarp>
-                    <a:noAutofit/>
-                  </a:bodyPr>
-                  <a:lstStyle/>
-                  <a:p>
-                    <a:pPr algn="ctr"/>
-                    <a:endParaRPr lang="en-GB"/>
-                  </a:p>
-                </p:txBody>
-              </p:sp>
-            </p:grpSp>
-            <p:sp>
-              <p:nvSpPr>
-                <p:cNvPr id="299" name="Rounded Rectangle 298">
-                  <a:extLst>
-                    <a:ext uri="{FF2B5EF4-FFF2-40B4-BE49-F238E27FC236}">
-                      <a16:creationId xmlns:a16="http://schemas.microsoft.com/office/drawing/2014/main" id="{35D13526-3238-A54B-845D-7437A104C442}"/>
-                    </a:ext>
-                  </a:extLst>
-                </p:cNvPr>
-                <p:cNvSpPr/>
-                <p:nvPr/>
-              </p:nvSpPr>
-              <p:spPr>
-                <a:xfrm rot="10173171">
-                  <a:off x="4624993" y="6146585"/>
-                  <a:ext cx="219626" cy="572774"/>
-                </a:xfrm>
-                <a:prstGeom prst="roundRect">
-                  <a:avLst>
-                    <a:gd name="adj" fmla="val 41216"/>
-                  </a:avLst>
-                </a:prstGeom>
-                <a:grpFill/>
-                <a:ln>
-                  <a:noFill/>
-                </a:ln>
-              </p:spPr>
-              <p:style>
-                <a:lnRef idx="2">
-                  <a:schemeClr val="accent1">
-                    <a:shade val="50000"/>
-                  </a:schemeClr>
-                </a:lnRef>
-                <a:fillRef idx="1">
-                  <a:schemeClr val="accent1"/>
-                </a:fillRef>
-                <a:effectRef idx="0">
-                  <a:schemeClr val="accent1"/>
-                </a:effectRef>
-                <a:fontRef idx="minor">
-                  <a:schemeClr val="lt1"/>
-                </a:fontRef>
-              </p:style>
-              <p:txBody>
-                <a:bodyPr rot="0" spcFirstLastPara="0" vertOverflow="overflow" horzOverflow="overflow" vert="horz" wrap="square" lIns="91440" tIns="45720" rIns="91440" bIns="45720" numCol="1" spcCol="0" rtlCol="0" fromWordArt="0" anchor="ctr" anchorCtr="0" forceAA="0" compatLnSpc="1">
-                  <a:prstTxWarp prst="textNoShape">
-                    <a:avLst/>
-                  </a:prstTxWarp>
-                  <a:noAutofit/>
-                </a:bodyPr>
-                <a:lstStyle/>
-                <a:p>
-                  <a:pPr algn="ctr"/>
-                  <a:endParaRPr lang="en-GB"/>
-                </a:p>
-              </p:txBody>
-            </p:sp>
-          </p:grpSp>
-          <p:grpSp>
-            <p:nvGrpSpPr>
-              <p:cNvPr id="294" name="Group 293">
-                <a:extLst>
-                  <a:ext uri="{FF2B5EF4-FFF2-40B4-BE49-F238E27FC236}">
-                    <a16:creationId xmlns:a16="http://schemas.microsoft.com/office/drawing/2014/main" id="{E387C507-4788-804E-BFF6-8F7D23531FD0}"/>
-                  </a:ext>
-                </a:extLst>
-              </p:cNvPr>
-              <p:cNvGrpSpPr/>
-              <p:nvPr/>
-            </p:nvGrpSpPr>
-            <p:grpSpPr>
-              <a:xfrm>
-                <a:off x="4610365" y="6059983"/>
-                <a:ext cx="1159067" cy="869001"/>
-                <a:chOff x="4028105" y="6140963"/>
-                <a:chExt cx="1159067" cy="869001"/>
-              </a:xfrm>
-            </p:grpSpPr>
-            <p:sp>
-              <p:nvSpPr>
-                <p:cNvPr id="295" name="Rounded Rectangle 294">
-                  <a:extLst>
-                    <a:ext uri="{FF2B5EF4-FFF2-40B4-BE49-F238E27FC236}">
-                      <a16:creationId xmlns:a16="http://schemas.microsoft.com/office/drawing/2014/main" id="{A3E749DC-6CA5-EE46-9D94-A70570C72B65}"/>
-                    </a:ext>
-                  </a:extLst>
-                </p:cNvPr>
-                <p:cNvSpPr/>
-                <p:nvPr/>
-              </p:nvSpPr>
-              <p:spPr>
-                <a:xfrm rot="14184732">
-                  <a:off x="4262514" y="6402811"/>
-                  <a:ext cx="372744" cy="841561"/>
-                </a:xfrm>
-                <a:prstGeom prst="roundRect">
-                  <a:avLst/>
-                </a:prstGeom>
-                <a:solidFill>
-                  <a:srgbClr val="F8CC9A"/>
-                </a:solidFill>
-                <a:ln>
-                  <a:noFill/>
-                </a:ln>
-              </p:spPr>
-              <p:style>
-                <a:lnRef idx="2">
-                  <a:schemeClr val="accent1">
-                    <a:shade val="50000"/>
-                  </a:schemeClr>
-                </a:lnRef>
-                <a:fillRef idx="1">
-                  <a:schemeClr val="accent1"/>
-                </a:fillRef>
-                <a:effectRef idx="0">
-                  <a:schemeClr val="accent1"/>
-                </a:effectRef>
-                <a:fontRef idx="minor">
-                  <a:schemeClr val="lt1"/>
-                </a:fontRef>
-              </p:style>
-              <p:txBody>
-                <a:bodyPr rot="0" spcFirstLastPara="0" vertOverflow="overflow" horzOverflow="overflow" vert="horz" wrap="square" lIns="91440" tIns="45720" rIns="91440" bIns="45720" numCol="1" spcCol="0" rtlCol="0" fromWordArt="0" anchor="ctr" anchorCtr="0" forceAA="0" compatLnSpc="1">
-                  <a:prstTxWarp prst="textNoShape">
-                    <a:avLst/>
-                  </a:prstTxWarp>
-                  <a:noAutofit/>
-                </a:bodyPr>
-                <a:lstStyle/>
-                <a:p>
-                  <a:pPr algn="ctr"/>
-                  <a:endParaRPr lang="en-GB"/>
-                </a:p>
-              </p:txBody>
-            </p:sp>
-            <p:sp>
-              <p:nvSpPr>
-                <p:cNvPr id="296" name="Rounded Rectangle 295">
-                  <a:extLst>
-                    <a:ext uri="{FF2B5EF4-FFF2-40B4-BE49-F238E27FC236}">
-                      <a16:creationId xmlns:a16="http://schemas.microsoft.com/office/drawing/2014/main" id="{12CA54C0-69BA-8F40-A8B6-3B5211D78A95}"/>
-                    </a:ext>
-                  </a:extLst>
-                </p:cNvPr>
-                <p:cNvSpPr/>
-                <p:nvPr/>
-              </p:nvSpPr>
-              <p:spPr>
-                <a:xfrm rot="13845605">
-                  <a:off x="4697482" y="6246569"/>
-                  <a:ext cx="498133" cy="481246"/>
-                </a:xfrm>
-                <a:prstGeom prst="roundRect">
-                  <a:avLst>
-                    <a:gd name="adj" fmla="val 41216"/>
-                  </a:avLst>
-                </a:prstGeom>
-                <a:solidFill>
-                  <a:srgbClr val="F8CC9A"/>
-                </a:solidFill>
-                <a:ln>
-                  <a:noFill/>
-                </a:ln>
-              </p:spPr>
-              <p:style>
-                <a:lnRef idx="2">
-                  <a:schemeClr val="accent1">
-                    <a:shade val="50000"/>
-                  </a:schemeClr>
-                </a:lnRef>
-                <a:fillRef idx="1">
-                  <a:schemeClr val="accent1"/>
-                </a:fillRef>
-                <a:effectRef idx="0">
-                  <a:schemeClr val="accent1"/>
-                </a:effectRef>
-                <a:fontRef idx="minor">
-                  <a:schemeClr val="lt1"/>
-                </a:fontRef>
-              </p:style>
-              <p:txBody>
-                <a:bodyPr rot="0" spcFirstLastPara="0" vertOverflow="overflow" horzOverflow="overflow" vert="horz" wrap="square" lIns="91440" tIns="45720" rIns="91440" bIns="45720" numCol="1" spcCol="0" rtlCol="0" fromWordArt="0" anchor="ctr" anchorCtr="0" forceAA="0" compatLnSpc="1">
-                  <a:prstTxWarp prst="textNoShape">
-                    <a:avLst/>
-                  </a:prstTxWarp>
-                  <a:noAutofit/>
-                </a:bodyPr>
-                <a:lstStyle/>
-                <a:p>
-                  <a:pPr algn="ctr"/>
-                  <a:endParaRPr lang="en-GB"/>
-                </a:p>
-              </p:txBody>
-            </p:sp>
-            <p:sp>
-              <p:nvSpPr>
-                <p:cNvPr id="297" name="Rounded Rectangle 296">
-                  <a:extLst>
-                    <a:ext uri="{FF2B5EF4-FFF2-40B4-BE49-F238E27FC236}">
-                      <a16:creationId xmlns:a16="http://schemas.microsoft.com/office/drawing/2014/main" id="{69322305-1D4A-F740-8E04-1A8777263502}"/>
-                    </a:ext>
-                  </a:extLst>
-                </p:cNvPr>
-                <p:cNvSpPr/>
-                <p:nvPr/>
-              </p:nvSpPr>
-              <p:spPr>
-                <a:xfrm rot="10173171">
-                  <a:off x="4620879" y="6140963"/>
-                  <a:ext cx="170254" cy="572773"/>
-                </a:xfrm>
-                <a:prstGeom prst="roundRect">
-                  <a:avLst>
-                    <a:gd name="adj" fmla="val 41216"/>
-                  </a:avLst>
-                </a:prstGeom>
-                <a:solidFill>
-                  <a:srgbClr val="F8CC9A"/>
-                </a:solidFill>
-                <a:ln>
-                  <a:noFill/>
-                </a:ln>
-              </p:spPr>
-              <p:style>
-                <a:lnRef idx="2">
-                  <a:schemeClr val="accent1">
-                    <a:shade val="50000"/>
-                  </a:schemeClr>
-                </a:lnRef>
-                <a:fillRef idx="1">
-                  <a:schemeClr val="accent1"/>
-                </a:fillRef>
-                <a:effectRef idx="0">
-                  <a:schemeClr val="accent1"/>
-                </a:effectRef>
-                <a:fontRef idx="minor">
-                  <a:schemeClr val="lt1"/>
-                </a:fontRef>
-              </p:style>
-              <p:txBody>
-                <a:bodyPr rot="0" spcFirstLastPara="0" vertOverflow="overflow" horzOverflow="overflow" vert="horz" wrap="square" lIns="91440" tIns="45720" rIns="91440" bIns="45720" numCol="1" spcCol="0" rtlCol="0" fromWordArt="0" anchor="ctr" anchorCtr="0" forceAA="0" compatLnSpc="1">
-                  <a:prstTxWarp prst="textNoShape">
-                    <a:avLst/>
-                  </a:prstTxWarp>
-                  <a:noAutofit/>
-                </a:bodyPr>
-                <a:lstStyle/>
-                <a:p>
-                  <a:pPr algn="ctr"/>
-                  <a:endParaRPr lang="en-GB"/>
-                </a:p>
-              </p:txBody>
-            </p:sp>
-          </p:grpSp>
-        </p:grpSp>
-        <p:grpSp>
-          <p:nvGrpSpPr>
-            <p:cNvPr id="273" name="Group 272">
-              <a:extLst>
-                <a:ext uri="{FF2B5EF4-FFF2-40B4-BE49-F238E27FC236}">
-                  <a16:creationId xmlns:a16="http://schemas.microsoft.com/office/drawing/2014/main" id="{C8E71CD6-267B-1D4C-9535-11C391E68A3F}"/>
-                </a:ext>
-              </a:extLst>
-            </p:cNvPr>
-            <p:cNvGrpSpPr>
-              <a:grpSpLocks noChangeAspect="1"/>
-            </p:cNvGrpSpPr>
-            <p:nvPr/>
-          </p:nvGrpSpPr>
-          <p:grpSpPr>
-            <a:xfrm>
-              <a:off x="2582202" y="5540985"/>
-              <a:ext cx="1067807" cy="2574839"/>
-              <a:chOff x="2120390" y="5713759"/>
-              <a:chExt cx="556258" cy="1497116"/>
-            </a:xfrm>
-          </p:grpSpPr>
-          <p:sp>
-            <p:nvSpPr>
-              <p:cNvPr id="287" name="Oval 286">
-                <a:extLst>
-                  <a:ext uri="{FF2B5EF4-FFF2-40B4-BE49-F238E27FC236}">
-                    <a16:creationId xmlns:a16="http://schemas.microsoft.com/office/drawing/2014/main" id="{CC24B14F-F99F-BB42-97C7-F63B5BAB147A}"/>
-                  </a:ext>
-                </a:extLst>
-              </p:cNvPr>
-              <p:cNvSpPr/>
-              <p:nvPr/>
-            </p:nvSpPr>
-            <p:spPr>
-              <a:xfrm>
-                <a:off x="2447721" y="5759324"/>
-                <a:ext cx="228927" cy="1303188"/>
-              </a:xfrm>
-              <a:prstGeom prst="ellipse">
-                <a:avLst/>
-              </a:prstGeom>
-              <a:solidFill>
-                <a:srgbClr val="D7AE85"/>
-              </a:solidFill>
-              <a:ln>
-                <a:noFill/>
-              </a:ln>
-            </p:spPr>
-            <p:style>
-              <a:lnRef idx="2">
-                <a:schemeClr val="accent1">
-                  <a:shade val="50000"/>
-                </a:schemeClr>
-              </a:lnRef>
-              <a:fillRef idx="1">
-                <a:schemeClr val="accent1"/>
-              </a:fillRef>
-              <a:effectRef idx="0">
-                <a:schemeClr val="accent1"/>
-              </a:effectRef>
-              <a:fontRef idx="minor">
-                <a:schemeClr val="lt1"/>
-              </a:fontRef>
-            </p:style>
-            <p:txBody>
-              <a:bodyPr rot="0" spcFirstLastPara="0" vertOverflow="overflow" horzOverflow="overflow" vert="horz" wrap="square" lIns="91440" tIns="45720" rIns="91440" bIns="45720" numCol="1" spcCol="0" rtlCol="0" fromWordArt="0" anchor="ctr" anchorCtr="0" forceAA="0" compatLnSpc="1">
-                <a:prstTxWarp prst="textNoShape">
-                  <a:avLst/>
-                </a:prstTxWarp>
-                <a:noAutofit/>
-              </a:bodyPr>
-              <a:lstStyle/>
-              <a:p>
-                <a:pPr algn="ctr"/>
-                <a:endParaRPr lang="en-GB">
-                  <a:solidFill>
-                    <a:schemeClr val="accent1">
-                      <a:alpha val="0"/>
-                    </a:schemeClr>
-                  </a:solidFill>
-                </a:endParaRPr>
-              </a:p>
-            </p:txBody>
-          </p:sp>
-          <p:sp>
-            <p:nvSpPr>
-              <p:cNvPr id="288" name="Rounded Rectangle 287">
-                <a:extLst>
-                  <a:ext uri="{FF2B5EF4-FFF2-40B4-BE49-F238E27FC236}">
-                    <a16:creationId xmlns:a16="http://schemas.microsoft.com/office/drawing/2014/main" id="{7A00D0A9-B92C-424A-9C63-3C55741E5692}"/>
-                  </a:ext>
-                </a:extLst>
-              </p:cNvPr>
-              <p:cNvSpPr/>
-              <p:nvPr/>
-            </p:nvSpPr>
-            <p:spPr>
-              <a:xfrm>
-                <a:off x="2162937" y="5713759"/>
-                <a:ext cx="450276" cy="1262483"/>
-              </a:xfrm>
-              <a:prstGeom prst="roundRect">
-                <a:avLst>
-                  <a:gd name="adj" fmla="val 26349"/>
-                </a:avLst>
-              </a:prstGeom>
-              <a:solidFill>
-                <a:srgbClr val="D7AE85"/>
-              </a:solidFill>
-              <a:ln>
-                <a:noFill/>
-              </a:ln>
-            </p:spPr>
-            <p:style>
-              <a:lnRef idx="2">
-                <a:schemeClr val="accent1">
-                  <a:shade val="50000"/>
-                </a:schemeClr>
-              </a:lnRef>
-              <a:fillRef idx="1">
-                <a:schemeClr val="accent1"/>
-              </a:fillRef>
-              <a:effectRef idx="0">
-                <a:schemeClr val="accent1"/>
-              </a:effectRef>
-              <a:fontRef idx="minor">
-                <a:schemeClr val="lt1"/>
-              </a:fontRef>
-            </p:style>
-            <p:txBody>
-              <a:bodyPr rot="0" spcFirstLastPara="0" vertOverflow="overflow" horzOverflow="overflow" vert="horz" wrap="square" lIns="91440" tIns="45720" rIns="91440" bIns="45720" numCol="1" spcCol="0" rtlCol="0" fromWordArt="0" anchor="ctr" anchorCtr="0" forceAA="0" compatLnSpc="1">
-                <a:prstTxWarp prst="textNoShape">
-                  <a:avLst/>
-                </a:prstTxWarp>
-                <a:noAutofit/>
-              </a:bodyPr>
-              <a:lstStyle/>
-              <a:p>
-                <a:pPr algn="ctr"/>
-                <a:endParaRPr lang="en-GB">
-                  <a:solidFill>
-                    <a:schemeClr val="accent1">
-                      <a:alpha val="0"/>
-                    </a:schemeClr>
-                  </a:solidFill>
-                </a:endParaRPr>
-              </a:p>
-            </p:txBody>
-          </p:sp>
-          <p:sp>
-            <p:nvSpPr>
-              <p:cNvPr id="289" name="Rounded Rectangle 288">
-                <a:extLst>
-                  <a:ext uri="{FF2B5EF4-FFF2-40B4-BE49-F238E27FC236}">
-                    <a16:creationId xmlns:a16="http://schemas.microsoft.com/office/drawing/2014/main" id="{3F1E151F-7D92-824E-B274-4D5065D3C310}"/>
-                  </a:ext>
-                </a:extLst>
-              </p:cNvPr>
-              <p:cNvSpPr/>
-              <p:nvPr/>
-            </p:nvSpPr>
-            <p:spPr>
-              <a:xfrm>
-                <a:off x="2193903" y="5752752"/>
-                <a:ext cx="351314" cy="1262483"/>
-              </a:xfrm>
-              <a:prstGeom prst="roundRect">
-                <a:avLst>
-                  <a:gd name="adj" fmla="val 4749"/>
-                </a:avLst>
-              </a:prstGeom>
-              <a:solidFill>
-                <a:srgbClr val="F8CC9A"/>
-              </a:solidFill>
-              <a:ln>
-                <a:noFill/>
-              </a:ln>
-            </p:spPr>
-            <p:style>
-              <a:lnRef idx="2">
-                <a:schemeClr val="accent1">
-                  <a:shade val="50000"/>
-                </a:schemeClr>
-              </a:lnRef>
-              <a:fillRef idx="1">
-                <a:schemeClr val="accent1"/>
-              </a:fillRef>
-              <a:effectRef idx="0">
-                <a:schemeClr val="accent1"/>
-              </a:effectRef>
-              <a:fontRef idx="minor">
-                <a:schemeClr val="lt1"/>
-              </a:fontRef>
-            </p:style>
-            <p:txBody>
-              <a:bodyPr rot="0" spcFirstLastPara="0" vertOverflow="overflow" horzOverflow="overflow" vert="horz" wrap="square" lIns="91440" tIns="45720" rIns="91440" bIns="45720" numCol="1" spcCol="0" rtlCol="0" fromWordArt="0" anchor="ctr" anchorCtr="0" forceAA="0" compatLnSpc="1">
-                <a:prstTxWarp prst="textNoShape">
-                  <a:avLst/>
-                </a:prstTxWarp>
-                <a:noAutofit/>
-              </a:bodyPr>
-              <a:lstStyle/>
-              <a:p>
-                <a:pPr algn="ctr"/>
-                <a:endParaRPr lang="en-GB" dirty="0">
-                  <a:solidFill>
-                    <a:schemeClr val="accent1">
-                      <a:alpha val="0"/>
-                    </a:schemeClr>
-                  </a:solidFill>
-                </a:endParaRPr>
-              </a:p>
-            </p:txBody>
-          </p:sp>
-          <p:sp>
-            <p:nvSpPr>
-              <p:cNvPr id="290" name="Oval 289">
-                <a:extLst>
-                  <a:ext uri="{FF2B5EF4-FFF2-40B4-BE49-F238E27FC236}">
-                    <a16:creationId xmlns:a16="http://schemas.microsoft.com/office/drawing/2014/main" id="{F234B2D7-CA30-834C-9A9A-0CAAF1B8F65C}"/>
-                  </a:ext>
-                </a:extLst>
-              </p:cNvPr>
-              <p:cNvSpPr/>
-              <p:nvPr/>
-            </p:nvSpPr>
-            <p:spPr>
-              <a:xfrm>
-                <a:off x="2120390" y="5754226"/>
-                <a:ext cx="152302" cy="1324151"/>
-              </a:xfrm>
-              <a:prstGeom prst="ellipse">
-                <a:avLst/>
-              </a:prstGeom>
-              <a:solidFill>
-                <a:srgbClr val="F8CC9A"/>
-              </a:solidFill>
-              <a:ln>
-                <a:noFill/>
-              </a:ln>
-            </p:spPr>
-            <p:style>
-              <a:lnRef idx="2">
-                <a:schemeClr val="accent1">
-                  <a:shade val="50000"/>
-                </a:schemeClr>
-              </a:lnRef>
-              <a:fillRef idx="1">
-                <a:schemeClr val="accent1"/>
-              </a:fillRef>
-              <a:effectRef idx="0">
-                <a:schemeClr val="accent1"/>
-              </a:effectRef>
-              <a:fontRef idx="minor">
-                <a:schemeClr val="lt1"/>
-              </a:fontRef>
-            </p:style>
-            <p:txBody>
-              <a:bodyPr rot="0" spcFirstLastPara="0" vertOverflow="overflow" horzOverflow="overflow" vert="horz" wrap="square" lIns="91440" tIns="45720" rIns="91440" bIns="45720" numCol="1" spcCol="0" rtlCol="0" fromWordArt="0" anchor="ctr" anchorCtr="0" forceAA="0" compatLnSpc="1">
-                <a:prstTxWarp prst="textNoShape">
-                  <a:avLst/>
-                </a:prstTxWarp>
-                <a:noAutofit/>
-              </a:bodyPr>
-              <a:lstStyle/>
-              <a:p>
-                <a:pPr algn="ctr"/>
-                <a:endParaRPr lang="en-GB">
-                  <a:solidFill>
-                    <a:schemeClr val="accent1">
-                      <a:alpha val="0"/>
-                    </a:schemeClr>
-                  </a:solidFill>
-                </a:endParaRPr>
-              </a:p>
-            </p:txBody>
-          </p:sp>
-          <p:sp>
-            <p:nvSpPr>
-              <p:cNvPr id="291" name="Oval 290">
-                <a:extLst>
-                  <a:ext uri="{FF2B5EF4-FFF2-40B4-BE49-F238E27FC236}">
-                    <a16:creationId xmlns:a16="http://schemas.microsoft.com/office/drawing/2014/main" id="{F6B5E50A-205E-2D4E-A880-466C485703B4}"/>
-                  </a:ext>
-                </a:extLst>
-              </p:cNvPr>
-              <p:cNvSpPr/>
-              <p:nvPr/>
-            </p:nvSpPr>
-            <p:spPr>
-              <a:xfrm>
-                <a:off x="2461019" y="5751826"/>
-                <a:ext cx="152302" cy="1324151"/>
-              </a:xfrm>
-              <a:prstGeom prst="ellipse">
-                <a:avLst/>
-              </a:prstGeom>
-              <a:solidFill>
-                <a:srgbClr val="F8CC9A"/>
-              </a:solidFill>
-              <a:ln>
-                <a:noFill/>
-              </a:ln>
-            </p:spPr>
-            <p:style>
-              <a:lnRef idx="2">
-                <a:schemeClr val="accent1">
-                  <a:shade val="50000"/>
-                </a:schemeClr>
-              </a:lnRef>
-              <a:fillRef idx="1">
-                <a:schemeClr val="accent1"/>
-              </a:fillRef>
-              <a:effectRef idx="0">
-                <a:schemeClr val="accent1"/>
-              </a:effectRef>
-              <a:fontRef idx="minor">
-                <a:schemeClr val="lt1"/>
-              </a:fontRef>
-            </p:style>
-            <p:txBody>
-              <a:bodyPr rot="0" spcFirstLastPara="0" vertOverflow="overflow" horzOverflow="overflow" vert="horz" wrap="square" lIns="91440" tIns="45720" rIns="91440" bIns="45720" numCol="1" spcCol="0" rtlCol="0" fromWordArt="0" anchor="ctr" anchorCtr="0" forceAA="0" compatLnSpc="1">
-                <a:prstTxWarp prst="textNoShape">
-                  <a:avLst/>
-                </a:prstTxWarp>
-                <a:noAutofit/>
-              </a:bodyPr>
-              <a:lstStyle/>
-              <a:p>
-                <a:pPr algn="ctr"/>
-                <a:endParaRPr lang="en-GB">
-                  <a:solidFill>
-                    <a:schemeClr val="accent1">
-                      <a:alpha val="0"/>
-                    </a:schemeClr>
-                  </a:solidFill>
-                </a:endParaRPr>
-              </a:p>
-            </p:txBody>
-          </p:sp>
-          <p:sp>
-            <p:nvSpPr>
-              <p:cNvPr id="292" name="Oval 291">
-                <a:extLst>
-                  <a:ext uri="{FF2B5EF4-FFF2-40B4-BE49-F238E27FC236}">
-                    <a16:creationId xmlns:a16="http://schemas.microsoft.com/office/drawing/2014/main" id="{021C7222-1C7D-CE45-AE59-5B8DD521AE2A}"/>
-                  </a:ext>
-                </a:extLst>
-              </p:cNvPr>
-              <p:cNvSpPr>
-                <a:spLocks noChangeAspect="1"/>
-              </p:cNvSpPr>
-              <p:nvPr/>
-            </p:nvSpPr>
-            <p:spPr>
-              <a:xfrm>
-                <a:off x="2152708" y="6723163"/>
-                <a:ext cx="436961" cy="487712"/>
-              </a:xfrm>
-              <a:prstGeom prst="ellipse">
-                <a:avLst/>
-              </a:prstGeom>
-              <a:solidFill>
-                <a:srgbClr val="F8CC9A"/>
-              </a:solidFill>
-              <a:ln>
-                <a:noFill/>
-              </a:ln>
-            </p:spPr>
-            <p:style>
-              <a:lnRef idx="2">
-                <a:schemeClr val="accent1">
-                  <a:shade val="50000"/>
-                </a:schemeClr>
-              </a:lnRef>
-              <a:fillRef idx="1">
-                <a:schemeClr val="accent1"/>
-              </a:fillRef>
-              <a:effectRef idx="0">
-                <a:schemeClr val="accent1"/>
-              </a:effectRef>
-              <a:fontRef idx="minor">
-                <a:schemeClr val="lt1"/>
-              </a:fontRef>
-            </p:style>
-            <p:txBody>
-              <a:bodyPr rot="0" spcFirstLastPara="0" vertOverflow="overflow" horzOverflow="overflow" vert="horz" wrap="square" lIns="91440" tIns="45720" rIns="91440" bIns="45720" numCol="1" spcCol="0" rtlCol="0" fromWordArt="0" anchor="ctr" anchorCtr="0" forceAA="0" compatLnSpc="1">
-                <a:prstTxWarp prst="textNoShape">
-                  <a:avLst/>
-                </a:prstTxWarp>
-                <a:noAutofit/>
-              </a:bodyPr>
-              <a:lstStyle/>
-              <a:p>
-                <a:pPr algn="ctr"/>
-                <a:endParaRPr lang="en-GB" dirty="0">
-                  <a:solidFill>
-                    <a:schemeClr val="accent1">
-                      <a:alpha val="0"/>
-                    </a:schemeClr>
-                  </a:solidFill>
-                </a:endParaRPr>
-              </a:p>
-            </p:txBody>
-          </p:sp>
-        </p:grpSp>
-        <p:sp>
-          <p:nvSpPr>
-            <p:cNvPr id="275" name="Rectangle 274">
-              <a:extLst>
-                <a:ext uri="{FF2B5EF4-FFF2-40B4-BE49-F238E27FC236}">
-                  <a16:creationId xmlns:a16="http://schemas.microsoft.com/office/drawing/2014/main" id="{3D761061-3A6A-104B-8FA6-05A92F13EBBA}"/>
-                </a:ext>
-              </a:extLst>
-            </p:cNvPr>
-            <p:cNvSpPr/>
-            <p:nvPr/>
-          </p:nvSpPr>
-          <p:spPr>
-            <a:xfrm>
-              <a:off x="2776233" y="6044855"/>
-              <a:ext cx="295900" cy="432262"/>
-            </a:xfrm>
-            <a:prstGeom prst="rect">
-              <a:avLst/>
-            </a:prstGeom>
-          </p:spPr>
-          <p:style>
-            <a:lnRef idx="2">
-              <a:schemeClr val="accent1">
-                <a:shade val="50000"/>
-              </a:schemeClr>
-            </a:lnRef>
-            <a:fillRef idx="1">
-              <a:schemeClr val="accent1"/>
-            </a:fillRef>
-            <a:effectRef idx="0">
-              <a:schemeClr val="accent1"/>
-            </a:effectRef>
-            <a:fontRef idx="minor">
-              <a:schemeClr val="lt1"/>
-            </a:fontRef>
-          </p:style>
-          <p:txBody>
-            <a:bodyPr rtlCol="0" anchor="ctr"/>
-            <a:lstStyle/>
-            <a:p>
-              <a:pPr algn="ctr"/>
-              <a:endParaRPr lang="en-GB"/>
-            </a:p>
-          </p:txBody>
-        </p:sp>
-        <p:sp>
-          <p:nvSpPr>
-            <p:cNvPr id="276" name="Rectangle 275">
-              <a:extLst>
-                <a:ext uri="{FF2B5EF4-FFF2-40B4-BE49-F238E27FC236}">
-                  <a16:creationId xmlns:a16="http://schemas.microsoft.com/office/drawing/2014/main" id="{86ECA559-40A1-974B-8E4A-F363C9677EAE}"/>
-                </a:ext>
-              </a:extLst>
-            </p:cNvPr>
-            <p:cNvSpPr/>
-            <p:nvPr/>
-          </p:nvSpPr>
-          <p:spPr>
-            <a:xfrm>
-              <a:off x="3167074" y="6052848"/>
-              <a:ext cx="295900" cy="432262"/>
-            </a:xfrm>
-            <a:prstGeom prst="rect">
-              <a:avLst/>
-            </a:prstGeom>
-          </p:spPr>
-          <p:style>
-            <a:lnRef idx="2">
-              <a:schemeClr val="accent1">
-                <a:shade val="50000"/>
-              </a:schemeClr>
-            </a:lnRef>
-            <a:fillRef idx="1">
-              <a:schemeClr val="accent1"/>
-            </a:fillRef>
-            <a:effectRef idx="0">
-              <a:schemeClr val="accent1"/>
-            </a:effectRef>
-            <a:fontRef idx="minor">
-              <a:schemeClr val="lt1"/>
-            </a:fontRef>
-          </p:style>
-          <p:txBody>
-            <a:bodyPr rtlCol="0" anchor="ctr"/>
-            <a:lstStyle/>
-            <a:p>
-              <a:pPr algn="ctr"/>
-              <a:endParaRPr lang="en-GB"/>
-            </a:p>
-          </p:txBody>
-        </p:sp>
-        <p:sp>
-          <p:nvSpPr>
-            <p:cNvPr id="277" name="Oval 276">
-              <a:extLst>
-                <a:ext uri="{FF2B5EF4-FFF2-40B4-BE49-F238E27FC236}">
-                  <a16:creationId xmlns:a16="http://schemas.microsoft.com/office/drawing/2014/main" id="{AA314C80-29FF-6B45-91A0-7D525F428D1B}"/>
-                </a:ext>
-              </a:extLst>
-            </p:cNvPr>
-            <p:cNvSpPr/>
-            <p:nvPr/>
-          </p:nvSpPr>
-          <p:spPr>
-            <a:xfrm>
-              <a:off x="2441083" y="6236034"/>
-              <a:ext cx="1391511" cy="1079864"/>
-            </a:xfrm>
-            <a:prstGeom prst="ellipse">
-              <a:avLst/>
-            </a:prstGeom>
-            <a:noFill/>
-            <a:ln w="50800"/>
-          </p:spPr>
-          <p:style>
-            <a:lnRef idx="2">
-              <a:schemeClr val="accent1">
-                <a:shade val="50000"/>
-              </a:schemeClr>
-            </a:lnRef>
-            <a:fillRef idx="1">
-              <a:schemeClr val="accent1"/>
-            </a:fillRef>
-            <a:effectRef idx="0">
-              <a:schemeClr val="accent1"/>
-            </a:effectRef>
-            <a:fontRef idx="minor">
-              <a:schemeClr val="lt1"/>
-            </a:fontRef>
-          </p:style>
-          <p:txBody>
-            <a:bodyPr rtlCol="0" anchor="ctr"/>
-            <a:lstStyle/>
-            <a:p>
-              <a:pPr algn="ctr"/>
-              <a:endParaRPr lang="en-GB"/>
-            </a:p>
-          </p:txBody>
-        </p:sp>
-        <p:sp>
-          <p:nvSpPr>
-            <p:cNvPr id="278" name="Rounded Rectangle 277">
-              <a:extLst>
-                <a:ext uri="{FF2B5EF4-FFF2-40B4-BE49-F238E27FC236}">
-                  <a16:creationId xmlns:a16="http://schemas.microsoft.com/office/drawing/2014/main" id="{7E489762-6C06-8F44-BB28-CAE5B9215FFA}"/>
-                </a:ext>
-              </a:extLst>
-            </p:cNvPr>
-            <p:cNvSpPr/>
-            <p:nvPr/>
-          </p:nvSpPr>
-          <p:spPr>
-            <a:xfrm>
-              <a:off x="3500272" y="6289912"/>
-              <a:ext cx="140265" cy="66061"/>
-            </a:xfrm>
-            <a:prstGeom prst="roundRect">
-              <a:avLst>
-                <a:gd name="adj" fmla="val 4749"/>
-              </a:avLst>
-            </a:prstGeom>
-            <a:solidFill>
-              <a:srgbClr val="D7AE85">
-                <a:alpha val="68000"/>
-              </a:srgbClr>
-            </a:solidFill>
-            <a:ln>
-              <a:noFill/>
-            </a:ln>
-          </p:spPr>
-          <p:style>
-            <a:lnRef idx="2">
-              <a:schemeClr val="accent1">
-                <a:shade val="50000"/>
-              </a:schemeClr>
-            </a:lnRef>
-            <a:fillRef idx="1">
-              <a:schemeClr val="accent1"/>
-            </a:fillRef>
-            <a:effectRef idx="0">
-              <a:schemeClr val="accent1"/>
-            </a:effectRef>
-            <a:fontRef idx="minor">
-              <a:schemeClr val="lt1"/>
-            </a:fontRef>
-          </p:style>
-          <p:txBody>
-            <a:bodyPr rot="0" spcFirstLastPara="0" vertOverflow="overflow" horzOverflow="overflow" vert="horz" wrap="square" lIns="91440" tIns="45720" rIns="91440" bIns="45720" numCol="1" spcCol="0" rtlCol="0" fromWordArt="0" anchor="ctr" anchorCtr="0" forceAA="0" compatLnSpc="1">
-              <a:prstTxWarp prst="textNoShape">
-                <a:avLst/>
-              </a:prstTxWarp>
-              <a:noAutofit/>
-            </a:bodyPr>
-            <a:lstStyle/>
-            <a:p>
-              <a:pPr algn="ctr"/>
-              <a:endParaRPr lang="en-GB" dirty="0">
-                <a:solidFill>
-                  <a:schemeClr val="accent1">
-                    <a:alpha val="0"/>
-                  </a:schemeClr>
-                </a:solidFill>
-              </a:endParaRPr>
-            </a:p>
-          </p:txBody>
-        </p:sp>
-        <p:sp>
-          <p:nvSpPr>
-            <p:cNvPr id="279" name="Rounded Rectangle 278">
-              <a:extLst>
-                <a:ext uri="{FF2B5EF4-FFF2-40B4-BE49-F238E27FC236}">
-                  <a16:creationId xmlns:a16="http://schemas.microsoft.com/office/drawing/2014/main" id="{C36FDE37-6465-6841-B9A5-78B5C7410BA9}"/>
-                </a:ext>
-              </a:extLst>
-            </p:cNvPr>
-            <p:cNvSpPr/>
-            <p:nvPr/>
-          </p:nvSpPr>
-          <p:spPr>
-            <a:xfrm>
-              <a:off x="3528237" y="6355973"/>
-              <a:ext cx="106641" cy="155516"/>
-            </a:xfrm>
-            <a:prstGeom prst="roundRect">
-              <a:avLst>
-                <a:gd name="adj" fmla="val 4749"/>
-              </a:avLst>
-            </a:prstGeom>
-            <a:solidFill>
-              <a:srgbClr val="D7AE85">
-                <a:alpha val="68000"/>
-              </a:srgbClr>
-            </a:solidFill>
-            <a:ln>
-              <a:noFill/>
-            </a:ln>
-          </p:spPr>
-          <p:style>
-            <a:lnRef idx="2">
-              <a:schemeClr val="accent1">
-                <a:shade val="50000"/>
-              </a:schemeClr>
-            </a:lnRef>
-            <a:fillRef idx="1">
-              <a:schemeClr val="accent1"/>
-            </a:fillRef>
-            <a:effectRef idx="0">
-              <a:schemeClr val="accent1"/>
-            </a:effectRef>
-            <a:fontRef idx="minor">
-              <a:schemeClr val="lt1"/>
-            </a:fontRef>
-          </p:style>
-          <p:txBody>
-            <a:bodyPr rot="0" spcFirstLastPara="0" vertOverflow="overflow" horzOverflow="overflow" vert="horz" wrap="square" lIns="91440" tIns="45720" rIns="91440" bIns="45720" numCol="1" spcCol="0" rtlCol="0" fromWordArt="0" anchor="ctr" anchorCtr="0" forceAA="0" compatLnSpc="1">
-              <a:prstTxWarp prst="textNoShape">
-                <a:avLst/>
-              </a:prstTxWarp>
-              <a:noAutofit/>
-            </a:bodyPr>
-            <a:lstStyle/>
-            <a:p>
-              <a:pPr algn="ctr"/>
-              <a:endParaRPr lang="en-GB" dirty="0">
-                <a:solidFill>
-                  <a:schemeClr val="accent1">
-                    <a:alpha val="0"/>
-                  </a:schemeClr>
-                </a:solidFill>
-              </a:endParaRPr>
-            </a:p>
-          </p:txBody>
-        </p:sp>
-        <p:sp>
-          <p:nvSpPr>
-            <p:cNvPr id="280" name="Rounded Rectangle 279">
-              <a:extLst>
-                <a:ext uri="{FF2B5EF4-FFF2-40B4-BE49-F238E27FC236}">
-                  <a16:creationId xmlns:a16="http://schemas.microsoft.com/office/drawing/2014/main" id="{E6D1A265-E5D0-1142-B214-8F8254A1AB29}"/>
-                </a:ext>
-              </a:extLst>
-            </p:cNvPr>
-            <p:cNvSpPr/>
-            <p:nvPr/>
-          </p:nvSpPr>
-          <p:spPr>
-            <a:xfrm>
-              <a:off x="2678074" y="5992941"/>
-              <a:ext cx="814428" cy="282299"/>
-            </a:xfrm>
-            <a:prstGeom prst="roundRect">
-              <a:avLst>
-                <a:gd name="adj" fmla="val 4749"/>
-              </a:avLst>
-            </a:prstGeom>
-            <a:solidFill>
-              <a:srgbClr val="F8CC9A">
-                <a:alpha val="68000"/>
-              </a:srgbClr>
-            </a:solidFill>
-            <a:ln>
-              <a:noFill/>
-            </a:ln>
-          </p:spPr>
-          <p:style>
-            <a:lnRef idx="2">
-              <a:schemeClr val="accent1">
-                <a:shade val="50000"/>
-              </a:schemeClr>
-            </a:lnRef>
-            <a:fillRef idx="1">
-              <a:schemeClr val="accent1"/>
-            </a:fillRef>
-            <a:effectRef idx="0">
-              <a:schemeClr val="accent1"/>
-            </a:effectRef>
-            <a:fontRef idx="minor">
-              <a:schemeClr val="lt1"/>
-            </a:fontRef>
-          </p:style>
-          <p:txBody>
-            <a:bodyPr rot="0" spcFirstLastPara="0" vertOverflow="overflow" horzOverflow="overflow" vert="horz" wrap="square" lIns="91440" tIns="45720" rIns="91440" bIns="45720" numCol="1" spcCol="0" rtlCol="0" fromWordArt="0" anchor="ctr" anchorCtr="0" forceAA="0" compatLnSpc="1">
-              <a:prstTxWarp prst="textNoShape">
-                <a:avLst/>
-              </a:prstTxWarp>
-              <a:noAutofit/>
-            </a:bodyPr>
-            <a:lstStyle/>
-            <a:p>
-              <a:pPr algn="ctr"/>
-              <a:endParaRPr lang="en-GB" dirty="0">
-                <a:solidFill>
-                  <a:schemeClr val="accent1">
-                    <a:alpha val="0"/>
-                  </a:schemeClr>
-                </a:solidFill>
-              </a:endParaRPr>
-            </a:p>
-          </p:txBody>
-        </p:sp>
-        <p:sp>
-          <p:nvSpPr>
-            <p:cNvPr id="281" name="Rounded Rectangle 280">
-              <a:extLst>
-                <a:ext uri="{FF2B5EF4-FFF2-40B4-BE49-F238E27FC236}">
-                  <a16:creationId xmlns:a16="http://schemas.microsoft.com/office/drawing/2014/main" id="{07A77C98-49C5-584C-8FF7-0401B478718C}"/>
-                </a:ext>
-              </a:extLst>
-            </p:cNvPr>
-            <p:cNvSpPr/>
-            <p:nvPr/>
-          </p:nvSpPr>
-          <p:spPr>
-            <a:xfrm>
-              <a:off x="2674189" y="6275874"/>
-              <a:ext cx="831118" cy="235614"/>
-            </a:xfrm>
-            <a:prstGeom prst="roundRect">
-              <a:avLst>
-                <a:gd name="adj" fmla="val 4749"/>
-              </a:avLst>
-            </a:prstGeom>
-            <a:solidFill>
-              <a:srgbClr val="F8CC9A">
-                <a:alpha val="68000"/>
-              </a:srgbClr>
-            </a:solidFill>
-            <a:ln>
-              <a:noFill/>
-            </a:ln>
-          </p:spPr>
-          <p:style>
-            <a:lnRef idx="2">
-              <a:schemeClr val="accent1">
-                <a:shade val="50000"/>
-              </a:schemeClr>
-            </a:lnRef>
-            <a:fillRef idx="1">
-              <a:schemeClr val="accent1"/>
-            </a:fillRef>
-            <a:effectRef idx="0">
-              <a:schemeClr val="accent1"/>
-            </a:effectRef>
-            <a:fontRef idx="minor">
-              <a:schemeClr val="lt1"/>
-            </a:fontRef>
-          </p:style>
-          <p:txBody>
-            <a:bodyPr rot="0" spcFirstLastPara="0" vertOverflow="overflow" horzOverflow="overflow" vert="horz" wrap="square" lIns="91440" tIns="45720" rIns="91440" bIns="45720" numCol="1" spcCol="0" rtlCol="0" fromWordArt="0" anchor="ctr" anchorCtr="0" forceAA="0" compatLnSpc="1">
-              <a:prstTxWarp prst="textNoShape">
-                <a:avLst/>
-              </a:prstTxWarp>
-              <a:noAutofit/>
-            </a:bodyPr>
-            <a:lstStyle/>
-            <a:p>
-              <a:pPr algn="ctr"/>
-              <a:endParaRPr lang="en-GB" dirty="0">
-                <a:solidFill>
-                  <a:schemeClr val="accent1">
-                    <a:alpha val="0"/>
-                  </a:schemeClr>
-                </a:solidFill>
-              </a:endParaRPr>
-            </a:p>
-          </p:txBody>
-        </p:sp>
-        <p:sp>
-          <p:nvSpPr>
-            <p:cNvPr id="282" name="Rounded Rectangle 281">
-              <a:extLst>
-                <a:ext uri="{FF2B5EF4-FFF2-40B4-BE49-F238E27FC236}">
-                  <a16:creationId xmlns:a16="http://schemas.microsoft.com/office/drawing/2014/main" id="{912198D2-21F4-5146-850A-15C2A97CFB16}"/>
-                </a:ext>
-              </a:extLst>
-            </p:cNvPr>
-            <p:cNvSpPr/>
-            <p:nvPr/>
-          </p:nvSpPr>
-          <p:spPr>
-            <a:xfrm>
-              <a:off x="2592320" y="6221274"/>
-              <a:ext cx="84157" cy="513496"/>
-            </a:xfrm>
-            <a:prstGeom prst="roundRect">
-              <a:avLst>
-                <a:gd name="adj" fmla="val 4749"/>
-              </a:avLst>
-            </a:prstGeom>
-            <a:solidFill>
-              <a:srgbClr val="F8CC9A">
-                <a:alpha val="68000"/>
-              </a:srgbClr>
-            </a:solidFill>
-            <a:ln>
-              <a:noFill/>
-            </a:ln>
-          </p:spPr>
-          <p:style>
-            <a:lnRef idx="2">
-              <a:schemeClr val="accent1">
-                <a:shade val="50000"/>
-              </a:schemeClr>
-            </a:lnRef>
-            <a:fillRef idx="1">
-              <a:schemeClr val="accent1"/>
-            </a:fillRef>
-            <a:effectRef idx="0">
-              <a:schemeClr val="accent1"/>
-            </a:effectRef>
-            <a:fontRef idx="minor">
-              <a:schemeClr val="lt1"/>
-            </a:fontRef>
-          </p:style>
-          <p:txBody>
-            <a:bodyPr rot="0" spcFirstLastPara="0" vertOverflow="overflow" horzOverflow="overflow" vert="horz" wrap="square" lIns="91440" tIns="45720" rIns="91440" bIns="45720" numCol="1" spcCol="0" rtlCol="0" fromWordArt="0" anchor="ctr" anchorCtr="0" forceAA="0" compatLnSpc="1">
-              <a:prstTxWarp prst="textNoShape">
-                <a:avLst/>
-              </a:prstTxWarp>
-              <a:noAutofit/>
-            </a:bodyPr>
-            <a:lstStyle/>
-            <a:p>
-              <a:pPr algn="ctr"/>
-              <a:endParaRPr lang="en-GB" dirty="0">
-                <a:solidFill>
-                  <a:schemeClr val="accent1">
-                    <a:alpha val="0"/>
-                  </a:schemeClr>
-                </a:solidFill>
-              </a:endParaRPr>
-            </a:p>
-          </p:txBody>
-        </p:sp>
-        <p:sp>
-          <p:nvSpPr>
-            <p:cNvPr id="283" name="Rectangle 282">
-              <a:extLst>
-                <a:ext uri="{FF2B5EF4-FFF2-40B4-BE49-F238E27FC236}">
-                  <a16:creationId xmlns:a16="http://schemas.microsoft.com/office/drawing/2014/main" id="{36B5732B-33D2-6044-AC2D-6D1034699241}"/>
-                </a:ext>
-              </a:extLst>
-            </p:cNvPr>
-            <p:cNvSpPr/>
-            <p:nvPr/>
-          </p:nvSpPr>
-          <p:spPr>
-            <a:xfrm>
-              <a:off x="3573543" y="6761569"/>
-              <a:ext cx="295900" cy="432262"/>
-            </a:xfrm>
-            <a:prstGeom prst="rect">
-              <a:avLst/>
-            </a:prstGeom>
-          </p:spPr>
-          <p:style>
-            <a:lnRef idx="2">
-              <a:schemeClr val="accent1">
-                <a:shade val="50000"/>
-              </a:schemeClr>
-            </a:lnRef>
-            <a:fillRef idx="1">
-              <a:schemeClr val="accent1"/>
-            </a:fillRef>
-            <a:effectRef idx="0">
-              <a:schemeClr val="accent1"/>
-            </a:effectRef>
-            <a:fontRef idx="minor">
-              <a:schemeClr val="lt1"/>
-            </a:fontRef>
-          </p:style>
-          <p:txBody>
-            <a:bodyPr rtlCol="0" anchor="ctr"/>
-            <a:lstStyle/>
-            <a:p>
-              <a:pPr algn="ctr"/>
-              <a:endParaRPr lang="en-GB"/>
-            </a:p>
-          </p:txBody>
-        </p:sp>
-        <p:sp>
-          <p:nvSpPr>
-            <p:cNvPr id="284" name="Rectangle 283">
-              <a:extLst>
-                <a:ext uri="{FF2B5EF4-FFF2-40B4-BE49-F238E27FC236}">
-                  <a16:creationId xmlns:a16="http://schemas.microsoft.com/office/drawing/2014/main" id="{F9A2634B-8D2B-4146-ACA8-9BEC9BA1C6AE}"/>
-                </a:ext>
-              </a:extLst>
-            </p:cNvPr>
-            <p:cNvSpPr/>
-            <p:nvPr/>
-          </p:nvSpPr>
-          <p:spPr>
-            <a:xfrm>
-              <a:off x="3139071" y="6983377"/>
-              <a:ext cx="295900" cy="432262"/>
-            </a:xfrm>
-            <a:prstGeom prst="rect">
-              <a:avLst/>
-            </a:prstGeom>
-          </p:spPr>
-          <p:style>
-            <a:lnRef idx="2">
-              <a:schemeClr val="accent1">
-                <a:shade val="50000"/>
-              </a:schemeClr>
-            </a:lnRef>
-            <a:fillRef idx="1">
-              <a:schemeClr val="accent1"/>
-            </a:fillRef>
-            <a:effectRef idx="0">
-              <a:schemeClr val="accent1"/>
-            </a:effectRef>
-            <a:fontRef idx="minor">
-              <a:schemeClr val="lt1"/>
-            </a:fontRef>
-          </p:style>
-          <p:txBody>
-            <a:bodyPr rtlCol="0" anchor="ctr"/>
-            <a:lstStyle/>
-            <a:p>
-              <a:pPr algn="ctr"/>
-              <a:endParaRPr lang="en-GB"/>
-            </a:p>
-          </p:txBody>
-        </p:sp>
-        <p:sp>
-          <p:nvSpPr>
-            <p:cNvPr id="285" name="Rectangle 284">
-              <a:extLst>
-                <a:ext uri="{FF2B5EF4-FFF2-40B4-BE49-F238E27FC236}">
-                  <a16:creationId xmlns:a16="http://schemas.microsoft.com/office/drawing/2014/main" id="{B97C6A8D-04BA-7741-BE2A-30EB15F610FD}"/>
-                </a:ext>
-              </a:extLst>
-            </p:cNvPr>
-            <p:cNvSpPr/>
-            <p:nvPr/>
-          </p:nvSpPr>
-          <p:spPr>
-            <a:xfrm>
-              <a:off x="2772958" y="6990326"/>
-              <a:ext cx="295900" cy="415488"/>
-            </a:xfrm>
-            <a:prstGeom prst="rect">
-              <a:avLst/>
-            </a:prstGeom>
-          </p:spPr>
-          <p:style>
-            <a:lnRef idx="2">
-              <a:schemeClr val="accent1">
-                <a:shade val="50000"/>
-              </a:schemeClr>
-            </a:lnRef>
-            <a:fillRef idx="1">
-              <a:schemeClr val="accent1"/>
-            </a:fillRef>
-            <a:effectRef idx="0">
-              <a:schemeClr val="accent1"/>
-            </a:effectRef>
-            <a:fontRef idx="minor">
-              <a:schemeClr val="lt1"/>
-            </a:fontRef>
-          </p:style>
-          <p:txBody>
-            <a:bodyPr rtlCol="0" anchor="ctr"/>
-            <a:lstStyle/>
-            <a:p>
-              <a:pPr algn="ctr"/>
-              <a:endParaRPr lang="en-GB"/>
-            </a:p>
-          </p:txBody>
-        </p:sp>
-        <p:sp>
-          <p:nvSpPr>
-            <p:cNvPr id="286" name="Rectangle 285">
-              <a:extLst>
-                <a:ext uri="{FF2B5EF4-FFF2-40B4-BE49-F238E27FC236}">
-                  <a16:creationId xmlns:a16="http://schemas.microsoft.com/office/drawing/2014/main" id="{1F5C0F97-677E-394D-A39E-077AF9ED1ED3}"/>
-                </a:ext>
-              </a:extLst>
-            </p:cNvPr>
-            <p:cNvSpPr/>
-            <p:nvPr/>
-          </p:nvSpPr>
-          <p:spPr>
-            <a:xfrm>
-              <a:off x="2361802" y="6767246"/>
-              <a:ext cx="295900" cy="432262"/>
-            </a:xfrm>
-            <a:prstGeom prst="rect">
-              <a:avLst/>
-            </a:prstGeom>
-          </p:spPr>
-          <p:style>
-            <a:lnRef idx="2">
-              <a:schemeClr val="accent1">
-                <a:shade val="50000"/>
-              </a:schemeClr>
-            </a:lnRef>
-            <a:fillRef idx="1">
-              <a:schemeClr val="accent1"/>
-            </a:fillRef>
-            <a:effectRef idx="0">
-              <a:schemeClr val="accent1"/>
-            </a:effectRef>
-            <a:fontRef idx="minor">
-              <a:schemeClr val="lt1"/>
-            </a:fontRef>
-          </p:style>
-          <p:txBody>
-            <a:bodyPr rtlCol="0" anchor="ctr"/>
-            <a:lstStyle/>
-            <a:p>
-              <a:pPr algn="ctr"/>
-              <a:endParaRPr lang="en-GB"/>
-            </a:p>
-          </p:txBody>
-        </p:sp>
-        <p:sp>
-          <p:nvSpPr>
-            <p:cNvPr id="271" name="Rectangle 270">
-              <a:extLst>
-                <a:ext uri="{FF2B5EF4-FFF2-40B4-BE49-F238E27FC236}">
-                  <a16:creationId xmlns:a16="http://schemas.microsoft.com/office/drawing/2014/main" id="{FE229A1B-63BA-2A45-8006-608D78F52B9F}"/>
-                </a:ext>
-              </a:extLst>
-            </p:cNvPr>
-            <p:cNvSpPr/>
-            <p:nvPr/>
-          </p:nvSpPr>
-          <p:spPr>
-            <a:xfrm>
-              <a:off x="3560444" y="6210882"/>
-              <a:ext cx="295900" cy="432262"/>
-            </a:xfrm>
-            <a:prstGeom prst="rect">
-              <a:avLst/>
-            </a:prstGeom>
-            <a:solidFill>
-              <a:schemeClr val="accent1"/>
-            </a:solidFill>
-          </p:spPr>
-          <p:style>
-            <a:lnRef idx="2">
-              <a:schemeClr val="accent1">
-                <a:shade val="50000"/>
-              </a:schemeClr>
-            </a:lnRef>
-            <a:fillRef idx="1">
-              <a:schemeClr val="accent1"/>
-            </a:fillRef>
-            <a:effectRef idx="0">
-              <a:schemeClr val="accent1"/>
-            </a:effectRef>
-            <a:fontRef idx="minor">
-              <a:schemeClr val="lt1"/>
-            </a:fontRef>
-          </p:style>
-          <p:txBody>
-            <a:bodyPr rtlCol="0" anchor="ctr"/>
-            <a:lstStyle/>
-            <a:p>
-              <a:pPr algn="ctr"/>
-              <a:endParaRPr lang="en-GB" dirty="0"/>
-            </a:p>
-          </p:txBody>
-        </p:sp>
-        <p:sp>
-          <p:nvSpPr>
-            <p:cNvPr id="274" name="Rectangle 273">
-              <a:extLst>
-                <a:ext uri="{FF2B5EF4-FFF2-40B4-BE49-F238E27FC236}">
-                  <a16:creationId xmlns:a16="http://schemas.microsoft.com/office/drawing/2014/main" id="{5E269200-90E7-FB42-90FC-4D346E97989D}"/>
+                  <a16:creationId xmlns:a16="http://schemas.microsoft.com/office/drawing/2014/main" id="{E7FFB3BB-0A5E-5243-AD70-D338F7B48CCE}"/>
                 </a:ext>
               </a:extLst>
             </p:cNvPr>
@@ -26747,7 +23344,7 @@
           </p:nvSpPr>
           <p:spPr>
             <a:xfrm>
-              <a:off x="2674189" y="6275874"/>
+              <a:off x="2674189" y="6268059"/>
               <a:ext cx="831118" cy="235614"/>
             </a:xfrm>
             <a:prstGeom prst="roundRect">
@@ -28387,7 +24984,7 @@
           <p:spPr>
             <a:xfrm>
               <a:off x="2678074" y="5992941"/>
-              <a:ext cx="814428" cy="282299"/>
+              <a:ext cx="814428" cy="240915"/>
             </a:xfrm>
             <a:prstGeom prst="roundRect">
               <a:avLst>
@@ -28453,8 +25050,8 @@
           </p:nvSpPr>
           <p:spPr>
             <a:xfrm>
-              <a:off x="2674189" y="6275874"/>
-              <a:ext cx="831118" cy="235614"/>
+              <a:off x="2674189" y="6233856"/>
+              <a:ext cx="831118" cy="459530"/>
             </a:xfrm>
             <a:prstGeom prst="roundRect">
               <a:avLst>

</xml_diff>